<commit_message>
complete the explanation of rsd recons math principle
</commit_message>
<xml_diff>
--- a/figure/relaywall.pptx
+++ b/figure/relaywall.pptx
@@ -6,6 +6,7 @@
   </p:sldMasterIdLst>
   <p:sldIdLst>
     <p:sldId id="256" r:id="rId2"/>
+    <p:sldId id="257" r:id="rId3"/>
   </p:sldIdLst>
   <p:sldSz cx="12192000" cy="6858000"/>
   <p:notesSz cx="6858000" cy="9144000"/>
@@ -243,7 +244,7 @@
           <a:p>
             <a:fld id="{DD31B41E-3215-47C1-AC56-D42954CC1C53}" type="datetimeFigureOut">
               <a:rPr lang="zh-CN" altLang="en-US" smtClean="0"/>
-              <a:t>2022/2/26</a:t>
+              <a:t>2022/2/28</a:t>
             </a:fld>
             <a:endParaRPr lang="zh-CN" altLang="en-US"/>
           </a:p>
@@ -413,7 +414,7 @@
           <a:p>
             <a:fld id="{DD31B41E-3215-47C1-AC56-D42954CC1C53}" type="datetimeFigureOut">
               <a:rPr lang="zh-CN" altLang="en-US" smtClean="0"/>
-              <a:t>2022/2/26</a:t>
+              <a:t>2022/2/28</a:t>
             </a:fld>
             <a:endParaRPr lang="zh-CN" altLang="en-US"/>
           </a:p>
@@ -593,7 +594,7 @@
           <a:p>
             <a:fld id="{DD31B41E-3215-47C1-AC56-D42954CC1C53}" type="datetimeFigureOut">
               <a:rPr lang="zh-CN" altLang="en-US" smtClean="0"/>
-              <a:t>2022/2/26</a:t>
+              <a:t>2022/2/28</a:t>
             </a:fld>
             <a:endParaRPr lang="zh-CN" altLang="en-US"/>
           </a:p>
@@ -763,7 +764,7 @@
           <a:p>
             <a:fld id="{DD31B41E-3215-47C1-AC56-D42954CC1C53}" type="datetimeFigureOut">
               <a:rPr lang="zh-CN" altLang="en-US" smtClean="0"/>
-              <a:t>2022/2/26</a:t>
+              <a:t>2022/2/28</a:t>
             </a:fld>
             <a:endParaRPr lang="zh-CN" altLang="en-US"/>
           </a:p>
@@ -1009,7 +1010,7 @@
           <a:p>
             <a:fld id="{DD31B41E-3215-47C1-AC56-D42954CC1C53}" type="datetimeFigureOut">
               <a:rPr lang="zh-CN" altLang="en-US" smtClean="0"/>
-              <a:t>2022/2/26</a:t>
+              <a:t>2022/2/28</a:t>
             </a:fld>
             <a:endParaRPr lang="zh-CN" altLang="en-US"/>
           </a:p>
@@ -1241,7 +1242,7 @@
           <a:p>
             <a:fld id="{DD31B41E-3215-47C1-AC56-D42954CC1C53}" type="datetimeFigureOut">
               <a:rPr lang="zh-CN" altLang="en-US" smtClean="0"/>
-              <a:t>2022/2/26</a:t>
+              <a:t>2022/2/28</a:t>
             </a:fld>
             <a:endParaRPr lang="zh-CN" altLang="en-US"/>
           </a:p>
@@ -1608,7 +1609,7 @@
           <a:p>
             <a:fld id="{DD31B41E-3215-47C1-AC56-D42954CC1C53}" type="datetimeFigureOut">
               <a:rPr lang="zh-CN" altLang="en-US" smtClean="0"/>
-              <a:t>2022/2/26</a:t>
+              <a:t>2022/2/28</a:t>
             </a:fld>
             <a:endParaRPr lang="zh-CN" altLang="en-US"/>
           </a:p>
@@ -1726,7 +1727,7 @@
           <a:p>
             <a:fld id="{DD31B41E-3215-47C1-AC56-D42954CC1C53}" type="datetimeFigureOut">
               <a:rPr lang="zh-CN" altLang="en-US" smtClean="0"/>
-              <a:t>2022/2/26</a:t>
+              <a:t>2022/2/28</a:t>
             </a:fld>
             <a:endParaRPr lang="zh-CN" altLang="en-US"/>
           </a:p>
@@ -1821,7 +1822,7 @@
           <a:p>
             <a:fld id="{DD31B41E-3215-47C1-AC56-D42954CC1C53}" type="datetimeFigureOut">
               <a:rPr lang="zh-CN" altLang="en-US" smtClean="0"/>
-              <a:t>2022/2/26</a:t>
+              <a:t>2022/2/28</a:t>
             </a:fld>
             <a:endParaRPr lang="zh-CN" altLang="en-US"/>
           </a:p>
@@ -2098,7 +2099,7 @@
           <a:p>
             <a:fld id="{DD31B41E-3215-47C1-AC56-D42954CC1C53}" type="datetimeFigureOut">
               <a:rPr lang="zh-CN" altLang="en-US" smtClean="0"/>
-              <a:t>2022/2/26</a:t>
+              <a:t>2022/2/28</a:t>
             </a:fld>
             <a:endParaRPr lang="zh-CN" altLang="en-US"/>
           </a:p>
@@ -2351,7 +2352,7 @@
           <a:p>
             <a:fld id="{DD31B41E-3215-47C1-AC56-D42954CC1C53}" type="datetimeFigureOut">
               <a:rPr lang="zh-CN" altLang="en-US" smtClean="0"/>
-              <a:t>2022/2/26</a:t>
+              <a:t>2022/2/28</a:t>
             </a:fld>
             <a:endParaRPr lang="zh-CN" altLang="en-US"/>
           </a:p>
@@ -2564,7 +2565,7 @@
           <a:p>
             <a:fld id="{DD31B41E-3215-47C1-AC56-D42954CC1C53}" type="datetimeFigureOut">
               <a:rPr lang="zh-CN" altLang="en-US" smtClean="0"/>
-              <a:t>2022/2/26</a:t>
+              <a:t>2022/2/28</a:t>
             </a:fld>
             <a:endParaRPr lang="zh-CN" altLang="en-US"/>
           </a:p>
@@ -4202,11 +4203,7 @@
             </a:r>
             <a:r>
               <a:rPr lang="zh-CN" altLang="en-US" dirty="0" smtClean="0"/>
-              <a:t>相机</a:t>
-            </a:r>
-            <a:r>
-              <a:rPr lang="zh-CN" altLang="en-US" dirty="0" smtClean="0"/>
-              <a:t>孔</a:t>
+              <a:t>相机孔</a:t>
             </a:r>
             <a:r>
               <a:rPr lang="en-US" altLang="zh-CN" dirty="0" smtClean="0"/>
@@ -4233,6 +4230,838 @@
       </p:par>
     </p:tnLst>
   </p:timing>
+</p:sld>
+</file>
+
+<file path=ppt/slides/slide2.xml><?xml version="1.0" encoding="utf-8"?>
+<p:sld xmlns:a="http://schemas.openxmlformats.org/drawingml/2006/main" xmlns:r="http://schemas.openxmlformats.org/officeDocument/2006/relationships" xmlns:p="http://schemas.openxmlformats.org/presentationml/2006/main">
+  <p:cSld>
+    <p:spTree>
+      <p:nvGrpSpPr>
+        <p:cNvPr id="1" name=""/>
+        <p:cNvGrpSpPr/>
+        <p:nvPr/>
+      </p:nvGrpSpPr>
+      <p:grpSpPr>
+        <a:xfrm>
+          <a:off x="0" y="0"/>
+          <a:ext cx="0" cy="0"/>
+          <a:chOff x="0" y="0"/>
+          <a:chExt cx="0" cy="0"/>
+        </a:xfrm>
+      </p:grpSpPr>
+      <mc:AlternateContent xmlns:mc="http://schemas.openxmlformats.org/markup-compatibility/2006">
+        <mc:Choice xmlns:a14="http://schemas.microsoft.com/office/drawing/2010/main" Requires="a14">
+          <p:sp>
+            <p:nvSpPr>
+              <p:cNvPr id="2" name="文本框 1"/>
+              <p:cNvSpPr txBox="1"/>
+              <p:nvPr/>
+            </p:nvSpPr>
+            <p:spPr>
+              <a:xfrm>
+                <a:off x="5640265" y="2971800"/>
+                <a:ext cx="923586" cy="276999"/>
+              </a:xfrm>
+              <a:prstGeom prst="rect">
+                <a:avLst/>
+              </a:prstGeom>
+              <a:noFill/>
+            </p:spPr>
+            <p:txBody>
+              <a:bodyPr wrap="none" lIns="0" tIns="0" rIns="0" bIns="0" rtlCol="0">
+                <a:spAutoFit/>
+              </a:bodyPr>
+              <a:lstStyle/>
+              <a:p>
+                <a14:m>
+                  <m:oMathPara xmlns:m="http://schemas.openxmlformats.org/officeDocument/2006/math">
+                    <m:oMathParaPr>
+                      <m:jc m:val="centerGroup"/>
+                    </m:oMathParaPr>
+                    <m:oMath xmlns:m="http://schemas.openxmlformats.org/officeDocument/2006/math">
+                      <m:r>
+                        <a:rPr lang="en-US" altLang="zh-CN" b="0" i="1" smtClean="0">
+                          <a:latin typeface="Cambria Math" panose="02040503050406030204" pitchFamily="18" charset="0"/>
+                        </a:rPr>
+                        <m:t>(</m:t>
+                      </m:r>
+                      <m:sSub>
+                        <m:sSubPr>
+                          <m:ctrlPr>
+                            <a:rPr lang="en-US" altLang="zh-CN" b="0" i="1" smtClean="0">
+                              <a:latin typeface="Cambria Math" panose="02040503050406030204" pitchFamily="18" charset="0"/>
+                            </a:rPr>
+                          </m:ctrlPr>
+                        </m:sSubPr>
+                        <m:e>
+                          <m:r>
+                            <a:rPr lang="en-US" altLang="zh-CN" b="0" i="1" smtClean="0">
+                              <a:latin typeface="Cambria Math" panose="02040503050406030204" pitchFamily="18" charset="0"/>
+                            </a:rPr>
+                            <m:t>𝑥</m:t>
+                          </m:r>
+                        </m:e>
+                        <m:sub>
+                          <m:r>
+                            <a:rPr lang="en-US" altLang="zh-CN" b="0" i="1" smtClean="0">
+                              <a:latin typeface="Cambria Math" panose="02040503050406030204" pitchFamily="18" charset="0"/>
+                            </a:rPr>
+                            <m:t>𝑙𝑠</m:t>
+                          </m:r>
+                        </m:sub>
+                      </m:sSub>
+                      <m:r>
+                        <a:rPr lang="en-US" altLang="zh-CN" b="0" i="1" smtClean="0">
+                          <a:latin typeface="Cambria Math" panose="02040503050406030204" pitchFamily="18" charset="0"/>
+                        </a:rPr>
+                        <m:t>, </m:t>
+                      </m:r>
+                      <m:sSub>
+                        <m:sSubPr>
+                          <m:ctrlPr>
+                            <a:rPr lang="en-US" altLang="zh-CN" b="0" i="1" smtClean="0">
+                              <a:latin typeface="Cambria Math" panose="02040503050406030204" pitchFamily="18" charset="0"/>
+                            </a:rPr>
+                          </m:ctrlPr>
+                        </m:sSubPr>
+                        <m:e>
+                          <m:r>
+                            <a:rPr lang="en-US" altLang="zh-CN" b="0" i="1" smtClean="0">
+                              <a:latin typeface="Cambria Math" panose="02040503050406030204" pitchFamily="18" charset="0"/>
+                            </a:rPr>
+                            <m:t>𝑦</m:t>
+                          </m:r>
+                        </m:e>
+                        <m:sub>
+                          <m:r>
+                            <a:rPr lang="en-US" altLang="zh-CN" b="0" i="1" smtClean="0">
+                              <a:latin typeface="Cambria Math" panose="02040503050406030204" pitchFamily="18" charset="0"/>
+                            </a:rPr>
+                            <m:t>𝑙𝑠</m:t>
+                          </m:r>
+                        </m:sub>
+                      </m:sSub>
+                      <m:r>
+                        <a:rPr lang="en-US" altLang="zh-CN" b="0" i="1" smtClean="0">
+                          <a:latin typeface="Cambria Math" panose="02040503050406030204" pitchFamily="18" charset="0"/>
+                        </a:rPr>
+                        <m:t>)</m:t>
+                      </m:r>
+                    </m:oMath>
+                  </m:oMathPara>
+                </a14:m>
+                <a:endParaRPr lang="zh-CN" altLang="en-US" dirty="0"/>
+              </a:p>
+            </p:txBody>
+          </p:sp>
+        </mc:Choice>
+        <mc:Fallback>
+          <p:sp>
+            <p:nvSpPr>
+              <p:cNvPr id="2" name="文本框 1"/>
+              <p:cNvSpPr txBox="1">
+                <a:spLocks noRot="1" noChangeAspect="1" noMove="1" noResize="1" noEditPoints="1" noAdjustHandles="1" noChangeArrowheads="1" noChangeShapeType="1" noTextEdit="1"/>
+              </p:cNvSpPr>
+              <p:nvPr/>
+            </p:nvSpPr>
+            <p:spPr>
+              <a:xfrm>
+                <a:off x="5640265" y="2971800"/>
+                <a:ext cx="923586" cy="276999"/>
+              </a:xfrm>
+              <a:prstGeom prst="rect">
+                <a:avLst/>
+              </a:prstGeom>
+              <a:blipFill>
+                <a:blip r:embed="rId2"/>
+                <a:stretch>
+                  <a:fillRect l="-6579" t="-4444" r="-6579" b="-33333"/>
+                </a:stretch>
+              </a:blipFill>
+            </p:spPr>
+            <p:txBody>
+              <a:bodyPr/>
+              <a:lstStyle/>
+              <a:p>
+                <a:r>
+                  <a:rPr lang="zh-CN" altLang="en-US">
+                    <a:noFill/>
+                  </a:rPr>
+                  <a:t> </a:t>
+                </a:r>
+              </a:p>
+            </p:txBody>
+          </p:sp>
+        </mc:Fallback>
+      </mc:AlternateContent>
+      <mc:AlternateContent xmlns:mc="http://schemas.openxmlformats.org/markup-compatibility/2006">
+        <mc:Choice xmlns:a14="http://schemas.microsoft.com/office/drawing/2010/main" Requires="a14">
+          <p:sp>
+            <p:nvSpPr>
+              <p:cNvPr id="3" name="文本框 2"/>
+              <p:cNvSpPr txBox="1"/>
+              <p:nvPr/>
+            </p:nvSpPr>
+            <p:spPr>
+              <a:xfrm>
+                <a:off x="4048858" y="4035669"/>
+                <a:ext cx="1090620" cy="276999"/>
+              </a:xfrm>
+              <a:prstGeom prst="rect">
+                <a:avLst/>
+              </a:prstGeom>
+              <a:noFill/>
+            </p:spPr>
+            <p:txBody>
+              <a:bodyPr wrap="none" lIns="0" tIns="0" rIns="0" bIns="0" rtlCol="0">
+                <a:spAutoFit/>
+              </a:bodyPr>
+              <a:lstStyle/>
+              <a:p>
+                <a14:m>
+                  <m:oMathPara xmlns:m="http://schemas.openxmlformats.org/officeDocument/2006/math">
+                    <m:oMathParaPr>
+                      <m:jc m:val="centerGroup"/>
+                    </m:oMathParaPr>
+                    <m:oMath xmlns:m="http://schemas.openxmlformats.org/officeDocument/2006/math">
+                      <m:r>
+                        <a:rPr lang="en-US" altLang="zh-CN" b="0" i="1" smtClean="0">
+                          <a:latin typeface="Cambria Math" panose="02040503050406030204" pitchFamily="18" charset="0"/>
+                        </a:rPr>
+                        <m:t>(</m:t>
+                      </m:r>
+                      <m:sSub>
+                        <m:sSubPr>
+                          <m:ctrlPr>
+                            <a:rPr lang="en-US" altLang="zh-CN" b="0" i="1" smtClean="0">
+                              <a:latin typeface="Cambria Math" panose="02040503050406030204" pitchFamily="18" charset="0"/>
+                            </a:rPr>
+                          </m:ctrlPr>
+                        </m:sSubPr>
+                        <m:e>
+                          <m:r>
+                            <a:rPr lang="en-US" altLang="zh-CN" b="0" i="1" smtClean="0">
+                              <a:latin typeface="Cambria Math" panose="02040503050406030204" pitchFamily="18" charset="0"/>
+                            </a:rPr>
+                            <m:t>𝑥</m:t>
+                          </m:r>
+                        </m:e>
+                        <m:sub>
+                          <m:r>
+                            <a:rPr lang="en-US" altLang="zh-CN" b="0" i="1" smtClean="0">
+                              <a:latin typeface="Cambria Math" panose="02040503050406030204" pitchFamily="18" charset="0"/>
+                            </a:rPr>
+                            <m:t>𝑣</m:t>
+                          </m:r>
+                        </m:sub>
+                      </m:sSub>
+                      <m:r>
+                        <a:rPr lang="en-US" altLang="zh-CN" b="0" i="1" smtClean="0">
+                          <a:latin typeface="Cambria Math" panose="02040503050406030204" pitchFamily="18" charset="0"/>
+                        </a:rPr>
+                        <m:t>, </m:t>
+                      </m:r>
+                      <m:sSub>
+                        <m:sSubPr>
+                          <m:ctrlPr>
+                            <a:rPr lang="en-US" altLang="zh-CN" b="0" i="1" smtClean="0">
+                              <a:latin typeface="Cambria Math" panose="02040503050406030204" pitchFamily="18" charset="0"/>
+                            </a:rPr>
+                          </m:ctrlPr>
+                        </m:sSubPr>
+                        <m:e>
+                          <m:r>
+                            <a:rPr lang="en-US" altLang="zh-CN" b="0" i="1" smtClean="0">
+                              <a:latin typeface="Cambria Math" panose="02040503050406030204" pitchFamily="18" charset="0"/>
+                            </a:rPr>
+                            <m:t>𝑦</m:t>
+                          </m:r>
+                        </m:e>
+                        <m:sub>
+                          <m:r>
+                            <a:rPr lang="en-US" altLang="zh-CN" b="0" i="1" smtClean="0">
+                              <a:latin typeface="Cambria Math" panose="02040503050406030204" pitchFamily="18" charset="0"/>
+                            </a:rPr>
+                            <m:t>𝑣</m:t>
+                          </m:r>
+                        </m:sub>
+                      </m:sSub>
+                      <m:r>
+                        <a:rPr lang="en-US" altLang="zh-CN" b="0" i="1" smtClean="0">
+                          <a:latin typeface="Cambria Math" panose="02040503050406030204" pitchFamily="18" charset="0"/>
+                        </a:rPr>
+                        <m:t>, </m:t>
+                      </m:r>
+                      <m:sSub>
+                        <m:sSubPr>
+                          <m:ctrlPr>
+                            <a:rPr lang="en-US" altLang="zh-CN" b="0" i="1" smtClean="0">
+                              <a:latin typeface="Cambria Math" panose="02040503050406030204" pitchFamily="18" charset="0"/>
+                            </a:rPr>
+                          </m:ctrlPr>
+                        </m:sSubPr>
+                        <m:e>
+                          <m:r>
+                            <a:rPr lang="en-US" altLang="zh-CN" b="0" i="1" smtClean="0">
+                              <a:latin typeface="Cambria Math" panose="02040503050406030204" pitchFamily="18" charset="0"/>
+                            </a:rPr>
+                            <m:t>𝑧</m:t>
+                          </m:r>
+                        </m:e>
+                        <m:sub>
+                          <m:r>
+                            <a:rPr lang="en-US" altLang="zh-CN" b="0" i="1" smtClean="0">
+                              <a:latin typeface="Cambria Math" panose="02040503050406030204" pitchFamily="18" charset="0"/>
+                            </a:rPr>
+                            <m:t>𝑣</m:t>
+                          </m:r>
+                        </m:sub>
+                      </m:sSub>
+                      <m:r>
+                        <a:rPr lang="en-US" altLang="zh-CN" b="0" i="1" smtClean="0">
+                          <a:latin typeface="Cambria Math" panose="02040503050406030204" pitchFamily="18" charset="0"/>
+                        </a:rPr>
+                        <m:t>)</m:t>
+                      </m:r>
+                    </m:oMath>
+                  </m:oMathPara>
+                </a14:m>
+                <a:endParaRPr lang="zh-CN" altLang="en-US" dirty="0"/>
+              </a:p>
+            </p:txBody>
+          </p:sp>
+        </mc:Choice>
+        <mc:Fallback>
+          <p:sp>
+            <p:nvSpPr>
+              <p:cNvPr id="3" name="文本框 2"/>
+              <p:cNvSpPr txBox="1">
+                <a:spLocks noRot="1" noChangeAspect="1" noMove="1" noResize="1" noEditPoints="1" noAdjustHandles="1" noChangeArrowheads="1" noChangeShapeType="1" noTextEdit="1"/>
+              </p:cNvSpPr>
+              <p:nvPr/>
+            </p:nvSpPr>
+            <p:spPr>
+              <a:xfrm>
+                <a:off x="4048858" y="4035669"/>
+                <a:ext cx="1090620" cy="276999"/>
+              </a:xfrm>
+              <a:prstGeom prst="rect">
+                <a:avLst/>
+              </a:prstGeom>
+              <a:blipFill>
+                <a:blip r:embed="rId3"/>
+                <a:stretch>
+                  <a:fillRect l="-6704" t="-2222" r="-7263" b="-35556"/>
+                </a:stretch>
+              </a:blipFill>
+            </p:spPr>
+            <p:txBody>
+              <a:bodyPr/>
+              <a:lstStyle/>
+              <a:p>
+                <a:r>
+                  <a:rPr lang="zh-CN" altLang="en-US">
+                    <a:noFill/>
+                  </a:rPr>
+                  <a:t> </a:t>
+                </a:r>
+              </a:p>
+            </p:txBody>
+          </p:sp>
+        </mc:Fallback>
+      </mc:AlternateContent>
+      <mc:AlternateContent xmlns:mc="http://schemas.openxmlformats.org/markup-compatibility/2006">
+        <mc:Choice xmlns:a14="http://schemas.microsoft.com/office/drawing/2010/main" Requires="a14">
+          <p:sp>
+            <p:nvSpPr>
+              <p:cNvPr id="4" name="文本框 3"/>
+              <p:cNvSpPr txBox="1"/>
+              <p:nvPr/>
+            </p:nvSpPr>
+            <p:spPr>
+              <a:xfrm>
+                <a:off x="5868866" y="4035669"/>
+                <a:ext cx="1243930" cy="276999"/>
+              </a:xfrm>
+              <a:prstGeom prst="rect">
+                <a:avLst/>
+              </a:prstGeom>
+              <a:noFill/>
+            </p:spPr>
+            <p:txBody>
+              <a:bodyPr wrap="none" lIns="0" tIns="0" rIns="0" bIns="0" rtlCol="0">
+                <a:spAutoFit/>
+              </a:bodyPr>
+              <a:lstStyle/>
+              <a:p>
+                <a14:m>
+                  <m:oMathPara xmlns:m="http://schemas.openxmlformats.org/officeDocument/2006/math">
+                    <m:oMathParaPr>
+                      <m:jc m:val="centerGroup"/>
+                    </m:oMathParaPr>
+                    <m:oMath xmlns:m="http://schemas.openxmlformats.org/officeDocument/2006/math">
+                      <m:r>
+                        <a:rPr lang="en-US" altLang="zh-CN" b="0" i="1" smtClean="0">
+                          <a:latin typeface="Cambria Math" panose="02040503050406030204" pitchFamily="18" charset="0"/>
+                        </a:rPr>
+                        <m:t>𝐸</m:t>
+                      </m:r>
+                      <m:r>
+                        <a:rPr lang="en-US" altLang="zh-CN" b="0" i="1" smtClean="0">
+                          <a:latin typeface="Cambria Math" panose="02040503050406030204" pitchFamily="18" charset="0"/>
+                        </a:rPr>
+                        <m:t>(</m:t>
+                      </m:r>
+                      <m:sSub>
+                        <m:sSubPr>
+                          <m:ctrlPr>
+                            <a:rPr lang="en-US" altLang="zh-CN" b="0" i="1" smtClean="0">
+                              <a:latin typeface="Cambria Math" panose="02040503050406030204" pitchFamily="18" charset="0"/>
+                            </a:rPr>
+                          </m:ctrlPr>
+                        </m:sSubPr>
+                        <m:e>
+                          <m:r>
+                            <a:rPr lang="en-US" altLang="zh-CN" b="0" i="1" smtClean="0">
+                              <a:latin typeface="Cambria Math" panose="02040503050406030204" pitchFamily="18" charset="0"/>
+                            </a:rPr>
+                            <m:t>𝑥</m:t>
+                          </m:r>
+                        </m:e>
+                        <m:sub>
+                          <m:r>
+                            <a:rPr lang="en-US" altLang="zh-CN" b="0" i="1" smtClean="0">
+                              <a:latin typeface="Cambria Math" panose="02040503050406030204" pitchFamily="18" charset="0"/>
+                            </a:rPr>
+                            <m:t>𝑣</m:t>
+                          </m:r>
+                        </m:sub>
+                      </m:sSub>
+                      <m:r>
+                        <a:rPr lang="en-US" altLang="zh-CN" b="0" i="1" smtClean="0">
+                          <a:latin typeface="Cambria Math" panose="02040503050406030204" pitchFamily="18" charset="0"/>
+                        </a:rPr>
+                        <m:t>, </m:t>
+                      </m:r>
+                      <m:sSub>
+                        <m:sSubPr>
+                          <m:ctrlPr>
+                            <a:rPr lang="en-US" altLang="zh-CN" b="0" i="1" smtClean="0">
+                              <a:latin typeface="Cambria Math" panose="02040503050406030204" pitchFamily="18" charset="0"/>
+                            </a:rPr>
+                          </m:ctrlPr>
+                        </m:sSubPr>
+                        <m:e>
+                          <m:r>
+                            <a:rPr lang="en-US" altLang="zh-CN" b="0" i="1" smtClean="0">
+                              <a:latin typeface="Cambria Math" panose="02040503050406030204" pitchFamily="18" charset="0"/>
+                            </a:rPr>
+                            <m:t>𝑦</m:t>
+                          </m:r>
+                        </m:e>
+                        <m:sub>
+                          <m:r>
+                            <a:rPr lang="en-US" altLang="zh-CN" b="0" i="1" smtClean="0">
+                              <a:latin typeface="Cambria Math" panose="02040503050406030204" pitchFamily="18" charset="0"/>
+                            </a:rPr>
+                            <m:t>𝑣</m:t>
+                          </m:r>
+                        </m:sub>
+                      </m:sSub>
+                      <m:r>
+                        <a:rPr lang="en-US" altLang="zh-CN" b="0" i="1" smtClean="0">
+                          <a:latin typeface="Cambria Math" panose="02040503050406030204" pitchFamily="18" charset="0"/>
+                        </a:rPr>
+                        <m:t>, </m:t>
+                      </m:r>
+                      <m:sSub>
+                        <m:sSubPr>
+                          <m:ctrlPr>
+                            <a:rPr lang="en-US" altLang="zh-CN" b="0" i="1" smtClean="0">
+                              <a:latin typeface="Cambria Math" panose="02040503050406030204" pitchFamily="18" charset="0"/>
+                            </a:rPr>
+                          </m:ctrlPr>
+                        </m:sSubPr>
+                        <m:e>
+                          <m:r>
+                            <a:rPr lang="en-US" altLang="zh-CN" b="0" i="1" smtClean="0">
+                              <a:latin typeface="Cambria Math" panose="02040503050406030204" pitchFamily="18" charset="0"/>
+                            </a:rPr>
+                            <m:t>𝑧</m:t>
+                          </m:r>
+                        </m:e>
+                        <m:sub>
+                          <m:r>
+                            <a:rPr lang="en-US" altLang="zh-CN" b="0" i="1" smtClean="0">
+                              <a:latin typeface="Cambria Math" panose="02040503050406030204" pitchFamily="18" charset="0"/>
+                            </a:rPr>
+                            <m:t>𝑣</m:t>
+                          </m:r>
+                        </m:sub>
+                      </m:sSub>
+                      <m:r>
+                        <a:rPr lang="en-US" altLang="zh-CN" b="0" i="1" smtClean="0">
+                          <a:latin typeface="Cambria Math" panose="02040503050406030204" pitchFamily="18" charset="0"/>
+                        </a:rPr>
+                        <m:t>)</m:t>
+                      </m:r>
+                    </m:oMath>
+                  </m:oMathPara>
+                </a14:m>
+                <a:endParaRPr lang="zh-CN" altLang="en-US" dirty="0"/>
+              </a:p>
+            </p:txBody>
+          </p:sp>
+        </mc:Choice>
+        <mc:Fallback>
+          <p:sp>
+            <p:nvSpPr>
+              <p:cNvPr id="4" name="文本框 3"/>
+              <p:cNvSpPr txBox="1">
+                <a:spLocks noRot="1" noChangeAspect="1" noMove="1" noResize="1" noEditPoints="1" noAdjustHandles="1" noChangeArrowheads="1" noChangeShapeType="1" noTextEdit="1"/>
+              </p:cNvSpPr>
+              <p:nvPr/>
+            </p:nvSpPr>
+            <p:spPr>
+              <a:xfrm>
+                <a:off x="5868866" y="4035669"/>
+                <a:ext cx="1243930" cy="276999"/>
+              </a:xfrm>
+              <a:prstGeom prst="rect">
+                <a:avLst/>
+              </a:prstGeom>
+              <a:blipFill>
+                <a:blip r:embed="rId4"/>
+                <a:stretch>
+                  <a:fillRect l="-3922" t="-2222" r="-6373" b="-35556"/>
+                </a:stretch>
+              </a:blipFill>
+            </p:spPr>
+            <p:txBody>
+              <a:bodyPr/>
+              <a:lstStyle/>
+              <a:p>
+                <a:r>
+                  <a:rPr lang="zh-CN" altLang="en-US">
+                    <a:noFill/>
+                  </a:rPr>
+                  <a:t> </a:t>
+                </a:r>
+              </a:p>
+            </p:txBody>
+          </p:sp>
+        </mc:Fallback>
+      </mc:AlternateContent>
+      <mc:AlternateContent xmlns:mc="http://schemas.openxmlformats.org/markup-compatibility/2006">
+        <mc:Choice xmlns:a14="http://schemas.microsoft.com/office/drawing/2010/main" Requires="a14">
+          <p:sp>
+            <p:nvSpPr>
+              <p:cNvPr id="5" name="文本框 4"/>
+              <p:cNvSpPr txBox="1"/>
+              <p:nvPr/>
+            </p:nvSpPr>
+            <p:spPr>
+              <a:xfrm>
+                <a:off x="4145573" y="4835769"/>
+                <a:ext cx="277512" cy="276999"/>
+              </a:xfrm>
+              <a:prstGeom prst="rect">
+                <a:avLst/>
+              </a:prstGeom>
+              <a:noFill/>
+            </p:spPr>
+            <p:txBody>
+              <a:bodyPr wrap="none" lIns="0" tIns="0" rIns="0" bIns="0" rtlCol="0">
+                <a:spAutoFit/>
+              </a:bodyPr>
+              <a:lstStyle/>
+              <a:p>
+                <a14:m>
+                  <m:oMathPara xmlns:m="http://schemas.openxmlformats.org/officeDocument/2006/math">
+                    <m:oMathParaPr>
+                      <m:jc m:val="centerGroup"/>
+                    </m:oMathParaPr>
+                    <m:oMath xmlns:m="http://schemas.openxmlformats.org/officeDocument/2006/math">
+                      <m:sSub>
+                        <m:sSubPr>
+                          <m:ctrlPr>
+                            <a:rPr lang="en-US" altLang="zh-CN" b="0" i="1" smtClean="0">
+                              <a:latin typeface="Cambria Math" panose="02040503050406030204" pitchFamily="18" charset="0"/>
+                            </a:rPr>
+                          </m:ctrlPr>
+                        </m:sSubPr>
+                        <m:e>
+                          <m:r>
+                            <a:rPr lang="en-US" altLang="zh-CN" b="0" i="1" smtClean="0">
+                              <a:latin typeface="Cambria Math" panose="02040503050406030204" pitchFamily="18" charset="0"/>
+                            </a:rPr>
+                            <m:t>𝑧</m:t>
+                          </m:r>
+                        </m:e>
+                        <m:sub>
+                          <m:r>
+                            <a:rPr lang="en-US" altLang="zh-CN" b="0" i="1" smtClean="0">
+                              <a:latin typeface="Cambria Math" panose="02040503050406030204" pitchFamily="18" charset="0"/>
+                            </a:rPr>
+                            <m:t>𝑣</m:t>
+                          </m:r>
+                        </m:sub>
+                      </m:sSub>
+                    </m:oMath>
+                  </m:oMathPara>
+                </a14:m>
+                <a:endParaRPr lang="zh-CN" altLang="en-US" dirty="0"/>
+              </a:p>
+            </p:txBody>
+          </p:sp>
+        </mc:Choice>
+        <mc:Fallback>
+          <p:sp>
+            <p:nvSpPr>
+              <p:cNvPr id="5" name="文本框 4"/>
+              <p:cNvSpPr txBox="1">
+                <a:spLocks noRot="1" noChangeAspect="1" noMove="1" noResize="1" noEditPoints="1" noAdjustHandles="1" noChangeArrowheads="1" noChangeShapeType="1" noTextEdit="1"/>
+              </p:cNvSpPr>
+              <p:nvPr/>
+            </p:nvSpPr>
+            <p:spPr>
+              <a:xfrm>
+                <a:off x="4145573" y="4835769"/>
+                <a:ext cx="277512" cy="276999"/>
+              </a:xfrm>
+              <a:prstGeom prst="rect">
+                <a:avLst/>
+              </a:prstGeom>
+              <a:blipFill>
+                <a:blip r:embed="rId5"/>
+                <a:stretch>
+                  <a:fillRect l="-10870" b="-10870"/>
+                </a:stretch>
+              </a:blipFill>
+            </p:spPr>
+            <p:txBody>
+              <a:bodyPr/>
+              <a:lstStyle/>
+              <a:p>
+                <a:r>
+                  <a:rPr lang="zh-CN" altLang="en-US">
+                    <a:noFill/>
+                  </a:rPr>
+                  <a:t> </a:t>
+                </a:r>
+              </a:p>
+            </p:txBody>
+          </p:sp>
+        </mc:Fallback>
+      </mc:AlternateContent>
+      <mc:AlternateContent xmlns:mc="http://schemas.openxmlformats.org/markup-compatibility/2006">
+        <mc:Choice xmlns:a14="http://schemas.microsoft.com/office/drawing/2010/main" Requires="a14">
+          <p:sp>
+            <p:nvSpPr>
+              <p:cNvPr id="7" name="文本框 6"/>
+              <p:cNvSpPr txBox="1"/>
+              <p:nvPr/>
+            </p:nvSpPr>
+            <p:spPr>
+              <a:xfrm>
+                <a:off x="4797425" y="2943225"/>
+                <a:ext cx="229550" cy="276999"/>
+              </a:xfrm>
+              <a:prstGeom prst="rect">
+                <a:avLst/>
+              </a:prstGeom>
+              <a:noFill/>
+            </p:spPr>
+            <p:txBody>
+              <a:bodyPr wrap="none" lIns="0" tIns="0" rIns="0" bIns="0" rtlCol="0">
+                <a:spAutoFit/>
+              </a:bodyPr>
+              <a:lstStyle/>
+              <a:p>
+                <a14:m>
+                  <m:oMathPara xmlns:m="http://schemas.openxmlformats.org/officeDocument/2006/math">
+                    <m:oMathParaPr>
+                      <m:jc m:val="centerGroup"/>
+                    </m:oMathParaPr>
+                    <m:oMath xmlns:m="http://schemas.openxmlformats.org/officeDocument/2006/math">
+                      <m:r>
+                        <a:rPr lang="en-US" altLang="zh-CN" b="0" i="1" smtClean="0">
+                          <a:latin typeface="Cambria Math" panose="02040503050406030204" pitchFamily="18" charset="0"/>
+                        </a:rPr>
+                        <m:t>𝐷</m:t>
+                      </m:r>
+                    </m:oMath>
+                  </m:oMathPara>
+                </a14:m>
+                <a:endParaRPr lang="zh-CN" altLang="en-US" dirty="0"/>
+              </a:p>
+            </p:txBody>
+          </p:sp>
+        </mc:Choice>
+        <mc:Fallback>
+          <p:sp>
+            <p:nvSpPr>
+              <p:cNvPr id="7" name="文本框 6"/>
+              <p:cNvSpPr txBox="1">
+                <a:spLocks noRot="1" noChangeAspect="1" noMove="1" noResize="1" noEditPoints="1" noAdjustHandles="1" noChangeArrowheads="1" noChangeShapeType="1" noTextEdit="1"/>
+              </p:cNvSpPr>
+              <p:nvPr/>
+            </p:nvSpPr>
+            <p:spPr>
+              <a:xfrm>
+                <a:off x="4797425" y="2943225"/>
+                <a:ext cx="229550" cy="276999"/>
+              </a:xfrm>
+              <a:prstGeom prst="rect">
+                <a:avLst/>
+              </a:prstGeom>
+              <a:blipFill>
+                <a:blip r:embed="rId6"/>
+                <a:stretch>
+                  <a:fillRect l="-23684" r="-15789" b="-6667"/>
+                </a:stretch>
+              </a:blipFill>
+            </p:spPr>
+            <p:txBody>
+              <a:bodyPr/>
+              <a:lstStyle/>
+              <a:p>
+                <a:r>
+                  <a:rPr lang="zh-CN" altLang="en-US">
+                    <a:noFill/>
+                  </a:rPr>
+                  <a:t> </a:t>
+                </a:r>
+              </a:p>
+            </p:txBody>
+          </p:sp>
+        </mc:Fallback>
+      </mc:AlternateContent>
+      <mc:AlternateContent xmlns:mc="http://schemas.openxmlformats.org/markup-compatibility/2006">
+        <mc:Choice xmlns:a14="http://schemas.microsoft.com/office/drawing/2010/main" Requires="a14">
+          <p:sp>
+            <p:nvSpPr>
+              <p:cNvPr id="8" name="文本框 7"/>
+              <p:cNvSpPr txBox="1"/>
+              <p:nvPr/>
+            </p:nvSpPr>
+            <p:spPr>
+              <a:xfrm>
+                <a:off x="5502275" y="2446216"/>
+                <a:ext cx="695062" cy="276999"/>
+              </a:xfrm>
+              <a:prstGeom prst="rect">
+                <a:avLst/>
+              </a:prstGeom>
+              <a:noFill/>
+            </p:spPr>
+            <p:txBody>
+              <a:bodyPr wrap="none" lIns="0" tIns="0" rIns="0" bIns="0" rtlCol="0">
+                <a:spAutoFit/>
+              </a:bodyPr>
+              <a:lstStyle/>
+              <a:p>
+                <a14:m>
+                  <m:oMathPara xmlns:m="http://schemas.openxmlformats.org/officeDocument/2006/math">
+                    <m:oMathParaPr>
+                      <m:jc m:val="centerGroup"/>
+                    </m:oMathParaPr>
+                    <m:oMath xmlns:m="http://schemas.openxmlformats.org/officeDocument/2006/math">
+                      <m:r>
+                        <a:rPr lang="en-US" altLang="zh-CN" b="0" i="1" smtClean="0">
+                          <a:latin typeface="Cambria Math" panose="02040503050406030204" pitchFamily="18" charset="0"/>
+                        </a:rPr>
+                        <m:t>𝑧</m:t>
+                      </m:r>
+                      <m:r>
+                        <a:rPr lang="en-US" altLang="zh-CN" b="0" i="1" smtClean="0">
+                          <a:latin typeface="Cambria Math" panose="02040503050406030204" pitchFamily="18" charset="0"/>
+                        </a:rPr>
+                        <m:t>=</m:t>
+                      </m:r>
+                      <m:sSub>
+                        <m:sSubPr>
+                          <m:ctrlPr>
+                            <a:rPr lang="en-US" altLang="zh-CN" b="0" i="1" smtClean="0">
+                              <a:latin typeface="Cambria Math" panose="02040503050406030204" pitchFamily="18" charset="0"/>
+                            </a:rPr>
+                          </m:ctrlPr>
+                        </m:sSubPr>
+                        <m:e>
+                          <m:r>
+                            <a:rPr lang="en-US" altLang="zh-CN" b="0" i="1" smtClean="0">
+                              <a:latin typeface="Cambria Math" panose="02040503050406030204" pitchFamily="18" charset="0"/>
+                            </a:rPr>
+                            <m:t>𝑧</m:t>
+                          </m:r>
+                        </m:e>
+                        <m:sub>
+                          <m:r>
+                            <a:rPr lang="en-US" altLang="zh-CN" b="0" i="1" smtClean="0">
+                              <a:latin typeface="Cambria Math" panose="02040503050406030204" pitchFamily="18" charset="0"/>
+                            </a:rPr>
+                            <m:t>𝑣</m:t>
+                          </m:r>
+                        </m:sub>
+                      </m:sSub>
+                    </m:oMath>
+                  </m:oMathPara>
+                </a14:m>
+                <a:endParaRPr lang="zh-CN" altLang="en-US" dirty="0"/>
+              </a:p>
+            </p:txBody>
+          </p:sp>
+        </mc:Choice>
+        <mc:Fallback>
+          <p:sp>
+            <p:nvSpPr>
+              <p:cNvPr id="8" name="文本框 7"/>
+              <p:cNvSpPr txBox="1">
+                <a:spLocks noRot="1" noChangeAspect="1" noMove="1" noResize="1" noEditPoints="1" noAdjustHandles="1" noChangeArrowheads="1" noChangeShapeType="1" noTextEdit="1"/>
+              </p:cNvSpPr>
+              <p:nvPr/>
+            </p:nvSpPr>
+            <p:spPr>
+              <a:xfrm>
+                <a:off x="5502275" y="2446216"/>
+                <a:ext cx="695062" cy="276999"/>
+              </a:xfrm>
+              <a:prstGeom prst="rect">
+                <a:avLst/>
+              </a:prstGeom>
+              <a:blipFill>
+                <a:blip r:embed="rId7"/>
+                <a:stretch>
+                  <a:fillRect l="-3509" b="-10870"/>
+                </a:stretch>
+              </a:blipFill>
+            </p:spPr>
+            <p:txBody>
+              <a:bodyPr/>
+              <a:lstStyle/>
+              <a:p>
+                <a:r>
+                  <a:rPr lang="zh-CN" altLang="en-US">
+                    <a:noFill/>
+                  </a:rPr>
+                  <a:t> </a:t>
+                </a:r>
+              </a:p>
+            </p:txBody>
+          </p:sp>
+        </mc:Fallback>
+      </mc:AlternateContent>
+    </p:spTree>
+    <p:extLst>
+      <p:ext uri="{BB962C8B-B14F-4D97-AF65-F5344CB8AC3E}">
+        <p14:creationId xmlns:p14="http://schemas.microsoft.com/office/powerpoint/2010/main" val="918091117"/>
+      </p:ext>
+    </p:extLst>
+  </p:cSld>
+  <p:clrMapOvr>
+    <a:masterClrMapping/>
+  </p:clrMapOvr>
 </p:sld>
 </file>
 

</xml_diff>

<commit_message>
add some figs; complete the second chapter
</commit_message>
<xml_diff>
--- a/figure/relaywall.pptx
+++ b/figure/relaywall.pptx
@@ -7,6 +7,7 @@
   <p:sldIdLst>
     <p:sldId id="256" r:id="rId2"/>
     <p:sldId id="257" r:id="rId3"/>
+    <p:sldId id="258" r:id="rId4"/>
   </p:sldIdLst>
   <p:sldSz cx="12192000" cy="6858000"/>
   <p:notesSz cx="6858000" cy="9144000"/>
@@ -244,7 +245,7 @@
           <a:p>
             <a:fld id="{DD31B41E-3215-47C1-AC56-D42954CC1C53}" type="datetimeFigureOut">
               <a:rPr lang="zh-CN" altLang="en-US" smtClean="0"/>
-              <a:t>2022/2/28</a:t>
+              <a:t>2022/3/2</a:t>
             </a:fld>
             <a:endParaRPr lang="zh-CN" altLang="en-US"/>
           </a:p>
@@ -414,7 +415,7 @@
           <a:p>
             <a:fld id="{DD31B41E-3215-47C1-AC56-D42954CC1C53}" type="datetimeFigureOut">
               <a:rPr lang="zh-CN" altLang="en-US" smtClean="0"/>
-              <a:t>2022/2/28</a:t>
+              <a:t>2022/3/2</a:t>
             </a:fld>
             <a:endParaRPr lang="zh-CN" altLang="en-US"/>
           </a:p>
@@ -594,7 +595,7 @@
           <a:p>
             <a:fld id="{DD31B41E-3215-47C1-AC56-D42954CC1C53}" type="datetimeFigureOut">
               <a:rPr lang="zh-CN" altLang="en-US" smtClean="0"/>
-              <a:t>2022/2/28</a:t>
+              <a:t>2022/3/2</a:t>
             </a:fld>
             <a:endParaRPr lang="zh-CN" altLang="en-US"/>
           </a:p>
@@ -764,7 +765,7 @@
           <a:p>
             <a:fld id="{DD31B41E-3215-47C1-AC56-D42954CC1C53}" type="datetimeFigureOut">
               <a:rPr lang="zh-CN" altLang="en-US" smtClean="0"/>
-              <a:t>2022/2/28</a:t>
+              <a:t>2022/3/2</a:t>
             </a:fld>
             <a:endParaRPr lang="zh-CN" altLang="en-US"/>
           </a:p>
@@ -1010,7 +1011,7 @@
           <a:p>
             <a:fld id="{DD31B41E-3215-47C1-AC56-D42954CC1C53}" type="datetimeFigureOut">
               <a:rPr lang="zh-CN" altLang="en-US" smtClean="0"/>
-              <a:t>2022/2/28</a:t>
+              <a:t>2022/3/2</a:t>
             </a:fld>
             <a:endParaRPr lang="zh-CN" altLang="en-US"/>
           </a:p>
@@ -1242,7 +1243,7 @@
           <a:p>
             <a:fld id="{DD31B41E-3215-47C1-AC56-D42954CC1C53}" type="datetimeFigureOut">
               <a:rPr lang="zh-CN" altLang="en-US" smtClean="0"/>
-              <a:t>2022/2/28</a:t>
+              <a:t>2022/3/2</a:t>
             </a:fld>
             <a:endParaRPr lang="zh-CN" altLang="en-US"/>
           </a:p>
@@ -1609,7 +1610,7 @@
           <a:p>
             <a:fld id="{DD31B41E-3215-47C1-AC56-D42954CC1C53}" type="datetimeFigureOut">
               <a:rPr lang="zh-CN" altLang="en-US" smtClean="0"/>
-              <a:t>2022/2/28</a:t>
+              <a:t>2022/3/2</a:t>
             </a:fld>
             <a:endParaRPr lang="zh-CN" altLang="en-US"/>
           </a:p>
@@ -1727,7 +1728,7 @@
           <a:p>
             <a:fld id="{DD31B41E-3215-47C1-AC56-D42954CC1C53}" type="datetimeFigureOut">
               <a:rPr lang="zh-CN" altLang="en-US" smtClean="0"/>
-              <a:t>2022/2/28</a:t>
+              <a:t>2022/3/2</a:t>
             </a:fld>
             <a:endParaRPr lang="zh-CN" altLang="en-US"/>
           </a:p>
@@ -1822,7 +1823,7 @@
           <a:p>
             <a:fld id="{DD31B41E-3215-47C1-AC56-D42954CC1C53}" type="datetimeFigureOut">
               <a:rPr lang="zh-CN" altLang="en-US" smtClean="0"/>
-              <a:t>2022/2/28</a:t>
+              <a:t>2022/3/2</a:t>
             </a:fld>
             <a:endParaRPr lang="zh-CN" altLang="en-US"/>
           </a:p>
@@ -2099,7 +2100,7 @@
           <a:p>
             <a:fld id="{DD31B41E-3215-47C1-AC56-D42954CC1C53}" type="datetimeFigureOut">
               <a:rPr lang="zh-CN" altLang="en-US" smtClean="0"/>
-              <a:t>2022/2/28</a:t>
+              <a:t>2022/3/2</a:t>
             </a:fld>
             <a:endParaRPr lang="zh-CN" altLang="en-US"/>
           </a:p>
@@ -2352,7 +2353,7 @@
           <a:p>
             <a:fld id="{DD31B41E-3215-47C1-AC56-D42954CC1C53}" type="datetimeFigureOut">
               <a:rPr lang="zh-CN" altLang="en-US" smtClean="0"/>
-              <a:t>2022/2/28</a:t>
+              <a:t>2022/3/2</a:t>
             </a:fld>
             <a:endParaRPr lang="zh-CN" altLang="en-US"/>
           </a:p>
@@ -2565,7 +2566,7 @@
           <a:p>
             <a:fld id="{DD31B41E-3215-47C1-AC56-D42954CC1C53}" type="datetimeFigureOut">
               <a:rPr lang="zh-CN" altLang="en-US" smtClean="0"/>
-              <a:t>2022/2/28</a:t>
+              <a:t>2022/3/2</a:t>
             </a:fld>
             <a:endParaRPr lang="zh-CN" altLang="en-US"/>
           </a:p>
@@ -4250,8 +4251,8 @@
           <a:chExt cx="0" cy="0"/>
         </a:xfrm>
       </p:grpSpPr>
-      <mc:AlternateContent xmlns:mc="http://schemas.openxmlformats.org/markup-compatibility/2006">
-        <mc:Choice xmlns:a14="http://schemas.microsoft.com/office/drawing/2010/main" Requires="a14">
+      <mc:AlternateContent xmlns:mc="http://schemas.openxmlformats.org/markup-compatibility/2006" xmlns:a14="http://schemas.microsoft.com/office/drawing/2010/main">
+        <mc:Choice Requires="a14">
           <p:sp>
             <p:nvSpPr>
               <p:cNvPr id="2" name="文本框 1"/>
@@ -4260,7 +4261,7 @@
             </p:nvSpPr>
             <p:spPr>
               <a:xfrm>
-                <a:off x="5640265" y="2971800"/>
+                <a:off x="7162727" y="942955"/>
                 <a:ext cx="923586" cy="276999"/>
               </a:xfrm>
               <a:prstGeom prst="rect">
@@ -4274,6 +4275,7 @@
               </a:bodyPr>
               <a:lstStyle/>
               <a:p>
+                <a:pPr/>
                 <a14:m>
                   <m:oMathPara xmlns:m="http://schemas.openxmlformats.org/officeDocument/2006/math">
                     <m:oMathParaPr>
@@ -4356,7 +4358,7 @@
             </p:txBody>
           </p:sp>
         </mc:Choice>
-        <mc:Fallback>
+        <mc:Fallback xmlns="">
           <p:sp>
             <p:nvSpPr>
               <p:cNvPr id="2" name="文本框 1"/>
@@ -4367,7 +4369,7 @@
             </p:nvSpPr>
             <p:spPr>
               <a:xfrm>
-                <a:off x="5640265" y="2971800"/>
+                <a:off x="7162727" y="942955"/>
                 <a:ext cx="923586" cy="276999"/>
               </a:xfrm>
               <a:prstGeom prst="rect">
@@ -4376,7 +4378,7 @@
               <a:blipFill>
                 <a:blip r:embed="rId2"/>
                 <a:stretch>
-                  <a:fillRect l="-6579" t="-4444" r="-6579" b="-33333"/>
+                  <a:fillRect l="-6623" t="-4444" r="-7285" b="-35556"/>
                 </a:stretch>
               </a:blipFill>
             </p:spPr>
@@ -4395,8 +4397,8 @@
           </p:sp>
         </mc:Fallback>
       </mc:AlternateContent>
-      <mc:AlternateContent xmlns:mc="http://schemas.openxmlformats.org/markup-compatibility/2006">
-        <mc:Choice xmlns:a14="http://schemas.microsoft.com/office/drawing/2010/main" Requires="a14">
+      <mc:AlternateContent xmlns:mc="http://schemas.openxmlformats.org/markup-compatibility/2006" xmlns:a14="http://schemas.microsoft.com/office/drawing/2010/main">
+        <mc:Choice Requires="a14">
           <p:sp>
             <p:nvSpPr>
               <p:cNvPr id="3" name="文本框 2"/>
@@ -4405,7 +4407,7 @@
             </p:nvSpPr>
             <p:spPr>
               <a:xfrm>
-                <a:off x="4048858" y="4035669"/>
+                <a:off x="1011093" y="417370"/>
                 <a:ext cx="1090620" cy="276999"/>
               </a:xfrm>
               <a:prstGeom prst="rect">
@@ -4419,6 +4421,7 @@
               </a:bodyPr>
               <a:lstStyle/>
               <a:p>
+                <a:pPr/>
                 <a14:m>
                   <m:oMathPara xmlns:m="http://schemas.openxmlformats.org/officeDocument/2006/math">
                     <m:oMathParaPr>
@@ -4532,7 +4535,7 @@
             </p:txBody>
           </p:sp>
         </mc:Choice>
-        <mc:Fallback>
+        <mc:Fallback xmlns="">
           <p:sp>
             <p:nvSpPr>
               <p:cNvPr id="3" name="文本框 2"/>
@@ -4543,7 +4546,7 @@
             </p:nvSpPr>
             <p:spPr>
               <a:xfrm>
-                <a:off x="4048858" y="4035669"/>
+                <a:off x="1011093" y="417370"/>
                 <a:ext cx="1090620" cy="276999"/>
               </a:xfrm>
               <a:prstGeom prst="rect">
@@ -4552,7 +4555,7 @@
               <a:blipFill>
                 <a:blip r:embed="rId3"/>
                 <a:stretch>
-                  <a:fillRect l="-6704" t="-2222" r="-7263" b="-35556"/>
+                  <a:fillRect l="-6704" t="-2174" r="-7263" b="-32609"/>
                 </a:stretch>
               </a:blipFill>
             </p:spPr>
@@ -4571,8 +4574,8 @@
           </p:sp>
         </mc:Fallback>
       </mc:AlternateContent>
-      <mc:AlternateContent xmlns:mc="http://schemas.openxmlformats.org/markup-compatibility/2006">
-        <mc:Choice xmlns:a14="http://schemas.microsoft.com/office/drawing/2010/main" Requires="a14">
+      <mc:AlternateContent xmlns:mc="http://schemas.openxmlformats.org/markup-compatibility/2006" xmlns:a14="http://schemas.microsoft.com/office/drawing/2010/main">
+        <mc:Choice Requires="a14">
           <p:sp>
             <p:nvSpPr>
               <p:cNvPr id="4" name="文本框 3"/>
@@ -4581,7 +4584,7 @@
             </p:nvSpPr>
             <p:spPr>
               <a:xfrm>
-                <a:off x="5868866" y="4035669"/>
+                <a:off x="2831101" y="417370"/>
                 <a:ext cx="1243930" cy="276999"/>
               </a:xfrm>
               <a:prstGeom prst="rect">
@@ -4595,6 +4598,7 @@
               </a:bodyPr>
               <a:lstStyle/>
               <a:p>
+                <a:pPr/>
                 <a14:m>
                   <m:oMathPara xmlns:m="http://schemas.openxmlformats.org/officeDocument/2006/math">
                     <m:oMathParaPr>
@@ -4714,7 +4718,7 @@
             </p:txBody>
           </p:sp>
         </mc:Choice>
-        <mc:Fallback>
+        <mc:Fallback xmlns="">
           <p:sp>
             <p:nvSpPr>
               <p:cNvPr id="4" name="文本框 3"/>
@@ -4725,7 +4729,7 @@
             </p:nvSpPr>
             <p:spPr>
               <a:xfrm>
-                <a:off x="5868866" y="4035669"/>
+                <a:off x="2831101" y="417370"/>
                 <a:ext cx="1243930" cy="276999"/>
               </a:xfrm>
               <a:prstGeom prst="rect">
@@ -4734,7 +4738,7 @@
               <a:blipFill>
                 <a:blip r:embed="rId4"/>
                 <a:stretch>
-                  <a:fillRect l="-3922" t="-2222" r="-6373" b="-35556"/>
+                  <a:fillRect l="-3431" t="-2174" r="-6373" b="-32609"/>
                 </a:stretch>
               </a:blipFill>
             </p:spPr>
@@ -4753,8 +4757,8 @@
           </p:sp>
         </mc:Fallback>
       </mc:AlternateContent>
-      <mc:AlternateContent xmlns:mc="http://schemas.openxmlformats.org/markup-compatibility/2006">
-        <mc:Choice xmlns:a14="http://schemas.microsoft.com/office/drawing/2010/main" Requires="a14">
+      <mc:AlternateContent xmlns:mc="http://schemas.openxmlformats.org/markup-compatibility/2006" xmlns:a14="http://schemas.microsoft.com/office/drawing/2010/main">
+        <mc:Choice Requires="a14">
           <p:sp>
             <p:nvSpPr>
               <p:cNvPr id="5" name="文本框 4"/>
@@ -4763,7 +4767,7 @@
             </p:nvSpPr>
             <p:spPr>
               <a:xfrm>
-                <a:off x="4145573" y="4835769"/>
+                <a:off x="1107808" y="1217470"/>
                 <a:ext cx="277512" cy="276999"/>
               </a:xfrm>
               <a:prstGeom prst="rect">
@@ -4777,6 +4781,7 @@
               </a:bodyPr>
               <a:lstStyle/>
               <a:p>
+                <a:pPr/>
                 <a14:m>
                   <m:oMathPara xmlns:m="http://schemas.openxmlformats.org/officeDocument/2006/math">
                     <m:oMathParaPr>
@@ -4816,7 +4821,7 @@
             </p:txBody>
           </p:sp>
         </mc:Choice>
-        <mc:Fallback>
+        <mc:Fallback xmlns="">
           <p:sp>
             <p:nvSpPr>
               <p:cNvPr id="5" name="文本框 4"/>
@@ -4827,7 +4832,7 @@
             </p:nvSpPr>
             <p:spPr>
               <a:xfrm>
-                <a:off x="4145573" y="4835769"/>
+                <a:off x="1107808" y="1217470"/>
                 <a:ext cx="277512" cy="276999"/>
               </a:xfrm>
               <a:prstGeom prst="rect">
@@ -4836,7 +4841,7 @@
               <a:blipFill>
                 <a:blip r:embed="rId5"/>
                 <a:stretch>
-                  <a:fillRect l="-10870" b="-10870"/>
+                  <a:fillRect l="-11111" b="-11111"/>
                 </a:stretch>
               </a:blipFill>
             </p:spPr>
@@ -4855,8 +4860,8 @@
           </p:sp>
         </mc:Fallback>
       </mc:AlternateContent>
-      <mc:AlternateContent xmlns:mc="http://schemas.openxmlformats.org/markup-compatibility/2006">
-        <mc:Choice xmlns:a14="http://schemas.microsoft.com/office/drawing/2010/main" Requires="a14">
+      <mc:AlternateContent xmlns:mc="http://schemas.openxmlformats.org/markup-compatibility/2006" xmlns:a14="http://schemas.microsoft.com/office/drawing/2010/main">
+        <mc:Choice Requires="a14">
           <p:sp>
             <p:nvSpPr>
               <p:cNvPr id="7" name="文本框 6"/>
@@ -4865,7 +4870,7 @@
             </p:nvSpPr>
             <p:spPr>
               <a:xfrm>
-                <a:off x="4797425" y="2943225"/>
+                <a:off x="6319887" y="914380"/>
                 <a:ext cx="229550" cy="276999"/>
               </a:xfrm>
               <a:prstGeom prst="rect">
@@ -4879,6 +4884,7 @@
               </a:bodyPr>
               <a:lstStyle/>
               <a:p>
+                <a:pPr/>
                 <a14:m>
                   <m:oMathPara xmlns:m="http://schemas.openxmlformats.org/officeDocument/2006/math">
                     <m:oMathParaPr>
@@ -4899,7 +4905,7 @@
             </p:txBody>
           </p:sp>
         </mc:Choice>
-        <mc:Fallback>
+        <mc:Fallback xmlns="">
           <p:sp>
             <p:nvSpPr>
               <p:cNvPr id="7" name="文本框 6"/>
@@ -4910,7 +4916,7 @@
             </p:nvSpPr>
             <p:spPr>
               <a:xfrm>
-                <a:off x="4797425" y="2943225"/>
+                <a:off x="6319887" y="914380"/>
                 <a:ext cx="229550" cy="276999"/>
               </a:xfrm>
               <a:prstGeom prst="rect">
@@ -4919,7 +4925,7 @@
               <a:blipFill>
                 <a:blip r:embed="rId6"/>
                 <a:stretch>
-                  <a:fillRect l="-23684" r="-15789" b="-6667"/>
+                  <a:fillRect l="-24324" r="-18919" b="-6667"/>
                 </a:stretch>
               </a:blipFill>
             </p:spPr>
@@ -4938,8 +4944,8 @@
           </p:sp>
         </mc:Fallback>
       </mc:AlternateContent>
-      <mc:AlternateContent xmlns:mc="http://schemas.openxmlformats.org/markup-compatibility/2006">
-        <mc:Choice xmlns:a14="http://schemas.microsoft.com/office/drawing/2010/main" Requires="a14">
+      <mc:AlternateContent xmlns:mc="http://schemas.openxmlformats.org/markup-compatibility/2006" xmlns:a14="http://schemas.microsoft.com/office/drawing/2010/main">
+        <mc:Choice Requires="a14">
           <p:sp>
             <p:nvSpPr>
               <p:cNvPr id="8" name="文本框 7"/>
@@ -4948,7 +4954,7 @@
             </p:nvSpPr>
             <p:spPr>
               <a:xfrm>
-                <a:off x="5502275" y="2446216"/>
+                <a:off x="7024737" y="417371"/>
                 <a:ext cx="695062" cy="276999"/>
               </a:xfrm>
               <a:prstGeom prst="rect">
@@ -4962,6 +4968,7 @@
               </a:bodyPr>
               <a:lstStyle/>
               <a:p>
+                <a:pPr/>
                 <a14:m>
                   <m:oMathPara xmlns:m="http://schemas.openxmlformats.org/officeDocument/2006/math">
                     <m:oMathParaPr>
@@ -5013,7 +5020,7 @@
             </p:txBody>
           </p:sp>
         </mc:Choice>
-        <mc:Fallback>
+        <mc:Fallback xmlns="">
           <p:sp>
             <p:nvSpPr>
               <p:cNvPr id="8" name="文本框 7"/>
@@ -5024,7 +5031,7 @@
             </p:nvSpPr>
             <p:spPr>
               <a:xfrm>
-                <a:off x="5502275" y="2446216"/>
+                <a:off x="7024737" y="417371"/>
                 <a:ext cx="695062" cy="276999"/>
               </a:xfrm>
               <a:prstGeom prst="rect">
@@ -5052,10 +5059,1317 @@
           </p:sp>
         </mc:Fallback>
       </mc:AlternateContent>
+      <mc:AlternateContent xmlns:mc="http://schemas.openxmlformats.org/markup-compatibility/2006" xmlns:a14="http://schemas.microsoft.com/office/drawing/2010/main">
+        <mc:Choice Requires="a14">
+          <p:sp>
+            <p:nvSpPr>
+              <p:cNvPr id="6" name="文本框 5"/>
+              <p:cNvSpPr txBox="1"/>
+              <p:nvPr/>
+            </p:nvSpPr>
+            <p:spPr>
+              <a:xfrm>
+                <a:off x="9369596" y="28555"/>
+                <a:ext cx="252120" cy="276999"/>
+              </a:xfrm>
+              <a:prstGeom prst="rect">
+                <a:avLst/>
+              </a:prstGeom>
+              <a:noFill/>
+            </p:spPr>
+            <p:txBody>
+              <a:bodyPr wrap="none" lIns="0" tIns="0" rIns="0" bIns="0" rtlCol="0">
+                <a:spAutoFit/>
+              </a:bodyPr>
+              <a:lstStyle/>
+              <a:p>
+                <a:pPr/>
+                <a14:m>
+                  <m:oMathPara xmlns:m="http://schemas.openxmlformats.org/officeDocument/2006/math">
+                    <m:oMathParaPr>
+                      <m:jc m:val="centerGroup"/>
+                    </m:oMathParaPr>
+                    <m:oMath xmlns:m="http://schemas.openxmlformats.org/officeDocument/2006/math">
+                      <m:sSub>
+                        <m:sSubPr>
+                          <m:ctrlPr>
+                            <a:rPr lang="en-US" altLang="zh-CN" b="0" i="1" smtClean="0">
+                              <a:latin typeface="Cambria Math" panose="02040503050406030204" pitchFamily="18" charset="0"/>
+                            </a:rPr>
+                          </m:ctrlPr>
+                        </m:sSubPr>
+                        <m:e>
+                          <m:r>
+                            <a:rPr lang="en-US" altLang="zh-CN" b="0" i="1" smtClean="0">
+                              <a:latin typeface="Cambria Math" panose="02040503050406030204" pitchFamily="18" charset="0"/>
+                            </a:rPr>
+                            <m:t>𝑡</m:t>
+                          </m:r>
+                        </m:e>
+                        <m:sub>
+                          <m:r>
+                            <a:rPr lang="en-US" altLang="zh-CN" b="0" i="1" smtClean="0">
+                              <a:latin typeface="Cambria Math" panose="02040503050406030204" pitchFamily="18" charset="0"/>
+                            </a:rPr>
+                            <m:t>1</m:t>
+                          </m:r>
+                        </m:sub>
+                      </m:sSub>
+                    </m:oMath>
+                  </m:oMathPara>
+                </a14:m>
+                <a:endParaRPr lang="zh-CN" altLang="en-US" i="1" dirty="0"/>
+              </a:p>
+            </p:txBody>
+          </p:sp>
+        </mc:Choice>
+        <mc:Fallback xmlns="">
+          <p:sp>
+            <p:nvSpPr>
+              <p:cNvPr id="6" name="文本框 5"/>
+              <p:cNvSpPr txBox="1">
+                <a:spLocks noRot="1" noChangeAspect="1" noMove="1" noResize="1" noEditPoints="1" noAdjustHandles="1" noChangeArrowheads="1" noChangeShapeType="1" noTextEdit="1"/>
+              </p:cNvSpPr>
+              <p:nvPr/>
+            </p:nvSpPr>
+            <p:spPr>
+              <a:xfrm>
+                <a:off x="9369596" y="28555"/>
+                <a:ext cx="252120" cy="276999"/>
+              </a:xfrm>
+              <a:prstGeom prst="rect">
+                <a:avLst/>
+              </a:prstGeom>
+              <a:blipFill>
+                <a:blip r:embed="rId8"/>
+                <a:stretch>
+                  <a:fillRect l="-17073" r="-7317" b="-15556"/>
+                </a:stretch>
+              </a:blipFill>
+            </p:spPr>
+            <p:txBody>
+              <a:bodyPr/>
+              <a:lstStyle/>
+              <a:p>
+                <a:r>
+                  <a:rPr lang="zh-CN" altLang="en-US">
+                    <a:noFill/>
+                  </a:rPr>
+                  <a:t> </a:t>
+                </a:r>
+              </a:p>
+            </p:txBody>
+          </p:sp>
+        </mc:Fallback>
+      </mc:AlternateContent>
+      <mc:AlternateContent xmlns:mc="http://schemas.openxmlformats.org/markup-compatibility/2006" xmlns:a14="http://schemas.microsoft.com/office/drawing/2010/main">
+        <mc:Choice Requires="a14">
+          <p:sp>
+            <p:nvSpPr>
+              <p:cNvPr id="9" name="文本框 8"/>
+              <p:cNvSpPr txBox="1"/>
+              <p:nvPr/>
+            </p:nvSpPr>
+            <p:spPr>
+              <a:xfrm>
+                <a:off x="10389504" y="608826"/>
+                <a:ext cx="257827" cy="276999"/>
+              </a:xfrm>
+              <a:prstGeom prst="rect">
+                <a:avLst/>
+              </a:prstGeom>
+              <a:noFill/>
+            </p:spPr>
+            <p:txBody>
+              <a:bodyPr wrap="none" lIns="0" tIns="0" rIns="0" bIns="0" rtlCol="0">
+                <a:spAutoFit/>
+              </a:bodyPr>
+              <a:lstStyle/>
+              <a:p>
+                <a:pPr/>
+                <a14:m>
+                  <m:oMathPara xmlns:m="http://schemas.openxmlformats.org/officeDocument/2006/math">
+                    <m:oMathParaPr>
+                      <m:jc m:val="centerGroup"/>
+                    </m:oMathParaPr>
+                    <m:oMath xmlns:m="http://schemas.openxmlformats.org/officeDocument/2006/math">
+                      <m:sSub>
+                        <m:sSubPr>
+                          <m:ctrlPr>
+                            <a:rPr lang="en-US" altLang="zh-CN" b="0" i="1" smtClean="0">
+                              <a:latin typeface="Cambria Math" panose="02040503050406030204" pitchFamily="18" charset="0"/>
+                            </a:rPr>
+                          </m:ctrlPr>
+                        </m:sSubPr>
+                        <m:e>
+                          <m:r>
+                            <a:rPr lang="en-US" altLang="zh-CN" b="0" i="1" smtClean="0">
+                              <a:latin typeface="Cambria Math" panose="02040503050406030204" pitchFamily="18" charset="0"/>
+                            </a:rPr>
+                            <m:t>𝑡</m:t>
+                          </m:r>
+                        </m:e>
+                        <m:sub>
+                          <m:r>
+                            <a:rPr lang="en-US" altLang="zh-CN" b="0" i="1" smtClean="0">
+                              <a:latin typeface="Cambria Math" panose="02040503050406030204" pitchFamily="18" charset="0"/>
+                            </a:rPr>
+                            <m:t>3</m:t>
+                          </m:r>
+                        </m:sub>
+                      </m:sSub>
+                    </m:oMath>
+                  </m:oMathPara>
+                </a14:m>
+                <a:endParaRPr lang="zh-CN" altLang="en-US" i="1" dirty="0"/>
+              </a:p>
+            </p:txBody>
+          </p:sp>
+        </mc:Choice>
+        <mc:Fallback xmlns="">
+          <p:sp>
+            <p:nvSpPr>
+              <p:cNvPr id="9" name="文本框 8"/>
+              <p:cNvSpPr txBox="1">
+                <a:spLocks noRot="1" noChangeAspect="1" noMove="1" noResize="1" noEditPoints="1" noAdjustHandles="1" noChangeArrowheads="1" noChangeShapeType="1" noTextEdit="1"/>
+              </p:cNvSpPr>
+              <p:nvPr/>
+            </p:nvSpPr>
+            <p:spPr>
+              <a:xfrm>
+                <a:off x="10389504" y="608826"/>
+                <a:ext cx="257827" cy="276999"/>
+              </a:xfrm>
+              <a:prstGeom prst="rect">
+                <a:avLst/>
+              </a:prstGeom>
+              <a:blipFill>
+                <a:blip r:embed="rId9"/>
+                <a:stretch>
+                  <a:fillRect l="-16279" r="-4651" b="-15556"/>
+                </a:stretch>
+              </a:blipFill>
+            </p:spPr>
+            <p:txBody>
+              <a:bodyPr/>
+              <a:lstStyle/>
+              <a:p>
+                <a:r>
+                  <a:rPr lang="zh-CN" altLang="en-US">
+                    <a:noFill/>
+                  </a:rPr>
+                  <a:t> </a:t>
+                </a:r>
+              </a:p>
+            </p:txBody>
+          </p:sp>
+        </mc:Fallback>
+      </mc:AlternateContent>
+      <mc:AlternateContent xmlns:mc="http://schemas.openxmlformats.org/markup-compatibility/2006" xmlns:a14="http://schemas.microsoft.com/office/drawing/2010/main">
+        <mc:Choice Requires="a14">
+          <p:sp>
+            <p:nvSpPr>
+              <p:cNvPr id="10" name="文本框 9"/>
+              <p:cNvSpPr txBox="1"/>
+              <p:nvPr/>
+            </p:nvSpPr>
+            <p:spPr>
+              <a:xfrm>
+                <a:off x="9844380" y="0"/>
+                <a:ext cx="257826" cy="276999"/>
+              </a:xfrm>
+              <a:prstGeom prst="rect">
+                <a:avLst/>
+              </a:prstGeom>
+              <a:noFill/>
+            </p:spPr>
+            <p:txBody>
+              <a:bodyPr wrap="none" lIns="0" tIns="0" rIns="0" bIns="0" rtlCol="0">
+                <a:spAutoFit/>
+              </a:bodyPr>
+              <a:lstStyle/>
+              <a:p>
+                <a:pPr/>
+                <a14:m>
+                  <m:oMathPara xmlns:m="http://schemas.openxmlformats.org/officeDocument/2006/math">
+                    <m:oMathParaPr>
+                      <m:jc m:val="centerGroup"/>
+                    </m:oMathParaPr>
+                    <m:oMath xmlns:m="http://schemas.openxmlformats.org/officeDocument/2006/math">
+                      <m:sSub>
+                        <m:sSubPr>
+                          <m:ctrlPr>
+                            <a:rPr lang="en-US" altLang="zh-CN" b="0" i="1" smtClean="0">
+                              <a:latin typeface="Cambria Math" panose="02040503050406030204" pitchFamily="18" charset="0"/>
+                            </a:rPr>
+                          </m:ctrlPr>
+                        </m:sSubPr>
+                        <m:e>
+                          <m:r>
+                            <a:rPr lang="en-US" altLang="zh-CN" b="0" i="1" smtClean="0">
+                              <a:latin typeface="Cambria Math" panose="02040503050406030204" pitchFamily="18" charset="0"/>
+                            </a:rPr>
+                            <m:t>𝑡</m:t>
+                          </m:r>
+                        </m:e>
+                        <m:sub>
+                          <m:r>
+                            <a:rPr lang="en-US" altLang="zh-CN" b="0" i="1" smtClean="0">
+                              <a:latin typeface="Cambria Math" panose="02040503050406030204" pitchFamily="18" charset="0"/>
+                            </a:rPr>
+                            <m:t>2</m:t>
+                          </m:r>
+                        </m:sub>
+                      </m:sSub>
+                    </m:oMath>
+                  </m:oMathPara>
+                </a14:m>
+                <a:endParaRPr lang="zh-CN" altLang="en-US" i="1" dirty="0"/>
+              </a:p>
+            </p:txBody>
+          </p:sp>
+        </mc:Choice>
+        <mc:Fallback xmlns="">
+          <p:sp>
+            <p:nvSpPr>
+              <p:cNvPr id="10" name="文本框 9"/>
+              <p:cNvSpPr txBox="1">
+                <a:spLocks noRot="1" noChangeAspect="1" noMove="1" noResize="1" noEditPoints="1" noAdjustHandles="1" noChangeArrowheads="1" noChangeShapeType="1" noTextEdit="1"/>
+              </p:cNvSpPr>
+              <p:nvPr/>
+            </p:nvSpPr>
+            <p:spPr>
+              <a:xfrm>
+                <a:off x="9844380" y="0"/>
+                <a:ext cx="257826" cy="276999"/>
+              </a:xfrm>
+              <a:prstGeom prst="rect">
+                <a:avLst/>
+              </a:prstGeom>
+              <a:blipFill>
+                <a:blip r:embed="rId10"/>
+                <a:stretch>
+                  <a:fillRect l="-19048" r="-4762" b="-15556"/>
+                </a:stretch>
+              </a:blipFill>
+            </p:spPr>
+            <p:txBody>
+              <a:bodyPr/>
+              <a:lstStyle/>
+              <a:p>
+                <a:r>
+                  <a:rPr lang="zh-CN" altLang="en-US">
+                    <a:noFill/>
+                  </a:rPr>
+                  <a:t> </a:t>
+                </a:r>
+              </a:p>
+            </p:txBody>
+          </p:sp>
+        </mc:Fallback>
+      </mc:AlternateContent>
+      <mc:AlternateContent xmlns:mc="http://schemas.openxmlformats.org/markup-compatibility/2006" xmlns:a14="http://schemas.microsoft.com/office/drawing/2010/main">
+        <mc:Choice Requires="a14">
+          <p:sp>
+            <p:nvSpPr>
+              <p:cNvPr id="11" name="文本框 10"/>
+              <p:cNvSpPr txBox="1"/>
+              <p:nvPr/>
+            </p:nvSpPr>
+            <p:spPr>
+              <a:xfrm>
+                <a:off x="10864289" y="555870"/>
+                <a:ext cx="257826" cy="276999"/>
+              </a:xfrm>
+              <a:prstGeom prst="rect">
+                <a:avLst/>
+              </a:prstGeom>
+              <a:noFill/>
+            </p:spPr>
+            <p:txBody>
+              <a:bodyPr wrap="none" lIns="0" tIns="0" rIns="0" bIns="0" rtlCol="0">
+                <a:spAutoFit/>
+              </a:bodyPr>
+              <a:lstStyle/>
+              <a:p>
+                <a:pPr/>
+                <a14:m>
+                  <m:oMathPara xmlns:m="http://schemas.openxmlformats.org/officeDocument/2006/math">
+                    <m:oMathParaPr>
+                      <m:jc m:val="centerGroup"/>
+                    </m:oMathParaPr>
+                    <m:oMath xmlns:m="http://schemas.openxmlformats.org/officeDocument/2006/math">
+                      <m:sSub>
+                        <m:sSubPr>
+                          <m:ctrlPr>
+                            <a:rPr lang="en-US" altLang="zh-CN" b="0" i="1" smtClean="0">
+                              <a:latin typeface="Cambria Math" panose="02040503050406030204" pitchFamily="18" charset="0"/>
+                            </a:rPr>
+                          </m:ctrlPr>
+                        </m:sSubPr>
+                        <m:e>
+                          <m:r>
+                            <a:rPr lang="en-US" altLang="zh-CN" b="0" i="1" smtClean="0">
+                              <a:latin typeface="Cambria Math" panose="02040503050406030204" pitchFamily="18" charset="0"/>
+                            </a:rPr>
+                            <m:t>𝑡</m:t>
+                          </m:r>
+                        </m:e>
+                        <m:sub>
+                          <m:r>
+                            <a:rPr lang="en-US" altLang="zh-CN" b="0" i="1" smtClean="0">
+                              <a:latin typeface="Cambria Math" panose="02040503050406030204" pitchFamily="18" charset="0"/>
+                            </a:rPr>
+                            <m:t>4</m:t>
+                          </m:r>
+                        </m:sub>
+                      </m:sSub>
+                    </m:oMath>
+                  </m:oMathPara>
+                </a14:m>
+                <a:endParaRPr lang="zh-CN" altLang="en-US" i="1" dirty="0"/>
+              </a:p>
+            </p:txBody>
+          </p:sp>
+        </mc:Choice>
+        <mc:Fallback xmlns="">
+          <p:sp>
+            <p:nvSpPr>
+              <p:cNvPr id="11" name="文本框 10"/>
+              <p:cNvSpPr txBox="1">
+                <a:spLocks noRot="1" noChangeAspect="1" noMove="1" noResize="1" noEditPoints="1" noAdjustHandles="1" noChangeArrowheads="1" noChangeShapeType="1" noTextEdit="1"/>
+              </p:cNvSpPr>
+              <p:nvPr/>
+            </p:nvSpPr>
+            <p:spPr>
+              <a:xfrm>
+                <a:off x="10864289" y="555870"/>
+                <a:ext cx="257826" cy="276999"/>
+              </a:xfrm>
+              <a:prstGeom prst="rect">
+                <a:avLst/>
+              </a:prstGeom>
+              <a:blipFill>
+                <a:blip r:embed="rId11"/>
+                <a:stretch>
+                  <a:fillRect l="-16667" r="-7143" b="-15217"/>
+                </a:stretch>
+              </a:blipFill>
+            </p:spPr>
+            <p:txBody>
+              <a:bodyPr/>
+              <a:lstStyle/>
+              <a:p>
+                <a:r>
+                  <a:rPr lang="zh-CN" altLang="en-US">
+                    <a:noFill/>
+                  </a:rPr>
+                  <a:t> </a:t>
+                </a:r>
+              </a:p>
+            </p:txBody>
+          </p:sp>
+        </mc:Fallback>
+      </mc:AlternateContent>
+      <mc:AlternateContent xmlns:mc="http://schemas.openxmlformats.org/markup-compatibility/2006" xmlns:a14="http://schemas.microsoft.com/office/drawing/2010/main">
+        <mc:Choice Requires="a14">
+          <p:sp>
+            <p:nvSpPr>
+              <p:cNvPr id="12" name="文本框 11"/>
+              <p:cNvSpPr txBox="1"/>
+              <p:nvPr/>
+            </p:nvSpPr>
+            <p:spPr>
+              <a:xfrm>
+                <a:off x="11258605" y="747325"/>
+                <a:ext cx="491545" cy="276999"/>
+              </a:xfrm>
+              <a:prstGeom prst="rect">
+                <a:avLst/>
+              </a:prstGeom>
+              <a:noFill/>
+            </p:spPr>
+            <p:txBody>
+              <a:bodyPr wrap="none" lIns="0" tIns="0" rIns="0" bIns="0" rtlCol="0">
+                <a:spAutoFit/>
+              </a:bodyPr>
+              <a:lstStyle/>
+              <a:p>
+                <a:pPr/>
+                <a14:m>
+                  <m:oMathPara xmlns:m="http://schemas.openxmlformats.org/officeDocument/2006/math">
+                    <m:oMathParaPr>
+                      <m:jc m:val="centerGroup"/>
+                    </m:oMathParaPr>
+                    <m:oMath xmlns:m="http://schemas.openxmlformats.org/officeDocument/2006/math">
+                      <m:sSub>
+                        <m:sSubPr>
+                          <m:ctrlPr>
+                            <a:rPr lang="en-US" altLang="zh-CN" b="0" i="1" smtClean="0">
+                              <a:latin typeface="Cambria Math" panose="02040503050406030204" pitchFamily="18" charset="0"/>
+                            </a:rPr>
+                          </m:ctrlPr>
+                        </m:sSubPr>
+                        <m:e>
+                          <m:r>
+                            <a:rPr lang="en-US" altLang="zh-CN" b="0" i="1" smtClean="0">
+                              <a:latin typeface="Cambria Math" panose="02040503050406030204" pitchFamily="18" charset="0"/>
+                            </a:rPr>
+                            <m:t>𝑡</m:t>
+                          </m:r>
+                        </m:e>
+                        <m:sub>
+                          <m:r>
+                            <a:rPr lang="en-US" altLang="zh-CN" b="0" i="1" smtClean="0">
+                              <a:latin typeface="Cambria Math" panose="02040503050406030204" pitchFamily="18" charset="0"/>
+                            </a:rPr>
+                            <m:t>𝑛</m:t>
+                          </m:r>
+                          <m:r>
+                            <a:rPr lang="en-US" altLang="zh-CN" b="0" i="1" smtClean="0">
+                              <a:latin typeface="Cambria Math" panose="02040503050406030204" pitchFamily="18" charset="0"/>
+                            </a:rPr>
+                            <m:t>−1</m:t>
+                          </m:r>
+                        </m:sub>
+                      </m:sSub>
+                    </m:oMath>
+                  </m:oMathPara>
+                </a14:m>
+                <a:endParaRPr lang="zh-CN" altLang="en-US" i="1" dirty="0"/>
+              </a:p>
+            </p:txBody>
+          </p:sp>
+        </mc:Choice>
+        <mc:Fallback xmlns="">
+          <p:sp>
+            <p:nvSpPr>
+              <p:cNvPr id="12" name="文本框 11"/>
+              <p:cNvSpPr txBox="1">
+                <a:spLocks noRot="1" noChangeAspect="1" noMove="1" noResize="1" noEditPoints="1" noAdjustHandles="1" noChangeArrowheads="1" noChangeShapeType="1" noTextEdit="1"/>
+              </p:cNvSpPr>
+              <p:nvPr/>
+            </p:nvSpPr>
+            <p:spPr>
+              <a:xfrm>
+                <a:off x="11258605" y="747325"/>
+                <a:ext cx="491545" cy="276999"/>
+              </a:xfrm>
+              <a:prstGeom prst="rect">
+                <a:avLst/>
+              </a:prstGeom>
+              <a:blipFill>
+                <a:blip r:embed="rId12"/>
+                <a:stretch>
+                  <a:fillRect l="-9877" r="-2469" b="-15556"/>
+                </a:stretch>
+              </a:blipFill>
+            </p:spPr>
+            <p:txBody>
+              <a:bodyPr/>
+              <a:lstStyle/>
+              <a:p>
+                <a:r>
+                  <a:rPr lang="zh-CN" altLang="en-US">
+                    <a:noFill/>
+                  </a:rPr>
+                  <a:t> </a:t>
+                </a:r>
+              </a:p>
+            </p:txBody>
+          </p:sp>
+        </mc:Fallback>
+      </mc:AlternateContent>
+      <mc:AlternateContent xmlns:mc="http://schemas.openxmlformats.org/markup-compatibility/2006" xmlns:a14="http://schemas.microsoft.com/office/drawing/2010/main">
+        <mc:Choice Requires="a14">
+          <p:sp>
+            <p:nvSpPr>
+              <p:cNvPr id="13" name="文本框 12"/>
+              <p:cNvSpPr txBox="1"/>
+              <p:nvPr/>
+            </p:nvSpPr>
+            <p:spPr>
+              <a:xfrm>
+                <a:off x="11365538" y="1283656"/>
+                <a:ext cx="271933" cy="276999"/>
+              </a:xfrm>
+              <a:prstGeom prst="rect">
+                <a:avLst/>
+              </a:prstGeom>
+              <a:noFill/>
+            </p:spPr>
+            <p:txBody>
+              <a:bodyPr wrap="none" lIns="0" tIns="0" rIns="0" bIns="0" rtlCol="0">
+                <a:spAutoFit/>
+              </a:bodyPr>
+              <a:lstStyle/>
+              <a:p>
+                <a:pPr/>
+                <a14:m>
+                  <m:oMathPara xmlns:m="http://schemas.openxmlformats.org/officeDocument/2006/math">
+                    <m:oMathParaPr>
+                      <m:jc m:val="centerGroup"/>
+                    </m:oMathParaPr>
+                    <m:oMath xmlns:m="http://schemas.openxmlformats.org/officeDocument/2006/math">
+                      <m:sSub>
+                        <m:sSubPr>
+                          <m:ctrlPr>
+                            <a:rPr lang="en-US" altLang="zh-CN" b="0" i="1" smtClean="0">
+                              <a:latin typeface="Cambria Math" panose="02040503050406030204" pitchFamily="18" charset="0"/>
+                            </a:rPr>
+                          </m:ctrlPr>
+                        </m:sSubPr>
+                        <m:e>
+                          <m:r>
+                            <a:rPr lang="en-US" altLang="zh-CN" b="0" i="1" smtClean="0">
+                              <a:latin typeface="Cambria Math" panose="02040503050406030204" pitchFamily="18" charset="0"/>
+                            </a:rPr>
+                            <m:t>𝑡</m:t>
+                          </m:r>
+                        </m:e>
+                        <m:sub>
+                          <m:r>
+                            <a:rPr lang="en-US" altLang="zh-CN" b="0" i="1" smtClean="0">
+                              <a:latin typeface="Cambria Math" panose="02040503050406030204" pitchFamily="18" charset="0"/>
+                            </a:rPr>
+                            <m:t>𝑛</m:t>
+                          </m:r>
+                        </m:sub>
+                      </m:sSub>
+                    </m:oMath>
+                  </m:oMathPara>
+                </a14:m>
+                <a:endParaRPr lang="zh-CN" altLang="en-US" i="1" dirty="0"/>
+              </a:p>
+            </p:txBody>
+          </p:sp>
+        </mc:Choice>
+        <mc:Fallback xmlns="">
+          <p:sp>
+            <p:nvSpPr>
+              <p:cNvPr id="13" name="文本框 12"/>
+              <p:cNvSpPr txBox="1">
+                <a:spLocks noRot="1" noChangeAspect="1" noMove="1" noResize="1" noEditPoints="1" noAdjustHandles="1" noChangeArrowheads="1" noChangeShapeType="1" noTextEdit="1"/>
+              </p:cNvSpPr>
+              <p:nvPr/>
+            </p:nvSpPr>
+            <p:spPr>
+              <a:xfrm>
+                <a:off x="11365538" y="1283656"/>
+                <a:ext cx="271933" cy="276999"/>
+              </a:xfrm>
+              <a:prstGeom prst="rect">
+                <a:avLst/>
+              </a:prstGeom>
+              <a:blipFill>
+                <a:blip r:embed="rId13"/>
+                <a:stretch>
+                  <a:fillRect l="-15556" b="-11111"/>
+                </a:stretch>
+              </a:blipFill>
+            </p:spPr>
+            <p:txBody>
+              <a:bodyPr/>
+              <a:lstStyle/>
+              <a:p>
+                <a:r>
+                  <a:rPr lang="zh-CN" altLang="en-US">
+                    <a:noFill/>
+                  </a:rPr>
+                  <a:t> </a:t>
+                </a:r>
+              </a:p>
+            </p:txBody>
+          </p:sp>
+        </mc:Fallback>
+      </mc:AlternateContent>
+      <mc:AlternateContent xmlns:mc="http://schemas.openxmlformats.org/markup-compatibility/2006" xmlns:a14="http://schemas.microsoft.com/office/drawing/2010/main">
+        <mc:Choice Requires="a14">
+          <p:sp>
+            <p:nvSpPr>
+              <p:cNvPr id="14" name="文本框 13"/>
+              <p:cNvSpPr txBox="1"/>
+              <p:nvPr/>
+            </p:nvSpPr>
+            <p:spPr>
+              <a:xfrm>
+                <a:off x="11393427" y="1780441"/>
+                <a:ext cx="491545" cy="276999"/>
+              </a:xfrm>
+              <a:prstGeom prst="rect">
+                <a:avLst/>
+              </a:prstGeom>
+              <a:noFill/>
+            </p:spPr>
+            <p:txBody>
+              <a:bodyPr wrap="none" lIns="0" tIns="0" rIns="0" bIns="0" rtlCol="0">
+                <a:spAutoFit/>
+              </a:bodyPr>
+              <a:lstStyle/>
+              <a:p>
+                <a:pPr/>
+                <a14:m>
+                  <m:oMathPara xmlns:m="http://schemas.openxmlformats.org/officeDocument/2006/math">
+                    <m:oMathParaPr>
+                      <m:jc m:val="centerGroup"/>
+                    </m:oMathParaPr>
+                    <m:oMath xmlns:m="http://schemas.openxmlformats.org/officeDocument/2006/math">
+                      <m:sSub>
+                        <m:sSubPr>
+                          <m:ctrlPr>
+                            <a:rPr lang="en-US" altLang="zh-CN" b="0" i="1" smtClean="0">
+                              <a:latin typeface="Cambria Math" panose="02040503050406030204" pitchFamily="18" charset="0"/>
+                            </a:rPr>
+                          </m:ctrlPr>
+                        </m:sSubPr>
+                        <m:e>
+                          <m:r>
+                            <a:rPr lang="en-US" altLang="zh-CN" b="0" i="1" smtClean="0">
+                              <a:latin typeface="Cambria Math" panose="02040503050406030204" pitchFamily="18" charset="0"/>
+                            </a:rPr>
+                            <m:t>𝑡</m:t>
+                          </m:r>
+                        </m:e>
+                        <m:sub>
+                          <m:r>
+                            <a:rPr lang="en-US" altLang="zh-CN" b="0" i="1" smtClean="0">
+                              <a:latin typeface="Cambria Math" panose="02040503050406030204" pitchFamily="18" charset="0"/>
+                            </a:rPr>
+                            <m:t>𝑛</m:t>
+                          </m:r>
+                          <m:r>
+                            <a:rPr lang="en-US" altLang="zh-CN" b="0" i="1" smtClean="0">
+                              <a:latin typeface="Cambria Math" panose="02040503050406030204" pitchFamily="18" charset="0"/>
+                            </a:rPr>
+                            <m:t>+1</m:t>
+                          </m:r>
+                        </m:sub>
+                      </m:sSub>
+                    </m:oMath>
+                  </m:oMathPara>
+                </a14:m>
+                <a:endParaRPr lang="zh-CN" altLang="en-US" i="1" dirty="0"/>
+              </a:p>
+            </p:txBody>
+          </p:sp>
+        </mc:Choice>
+        <mc:Fallback xmlns="">
+          <p:sp>
+            <p:nvSpPr>
+              <p:cNvPr id="14" name="文本框 13"/>
+              <p:cNvSpPr txBox="1">
+                <a:spLocks noRot="1" noChangeAspect="1" noMove="1" noResize="1" noEditPoints="1" noAdjustHandles="1" noChangeArrowheads="1" noChangeShapeType="1" noTextEdit="1"/>
+              </p:cNvSpPr>
+              <p:nvPr/>
+            </p:nvSpPr>
+            <p:spPr>
+              <a:xfrm>
+                <a:off x="11393427" y="1780441"/>
+                <a:ext cx="491545" cy="276999"/>
+              </a:xfrm>
+              <a:prstGeom prst="rect">
+                <a:avLst/>
+              </a:prstGeom>
+              <a:blipFill>
+                <a:blip r:embed="rId14"/>
+                <a:stretch>
+                  <a:fillRect l="-8642" r="-2469" b="-15217"/>
+                </a:stretch>
+              </a:blipFill>
+            </p:spPr>
+            <p:txBody>
+              <a:bodyPr/>
+              <a:lstStyle/>
+              <a:p>
+                <a:r>
+                  <a:rPr lang="zh-CN" altLang="en-US">
+                    <a:noFill/>
+                  </a:rPr>
+                  <a:t> </a:t>
+                </a:r>
+              </a:p>
+            </p:txBody>
+          </p:sp>
+        </mc:Fallback>
+      </mc:AlternateContent>
+      <mc:AlternateContent xmlns:mc="http://schemas.openxmlformats.org/markup-compatibility/2006" xmlns:a14="http://schemas.microsoft.com/office/drawing/2010/main">
+        <mc:Choice Requires="a14">
+          <p:sp>
+            <p:nvSpPr>
+              <p:cNvPr id="15" name="文本框 14"/>
+              <p:cNvSpPr txBox="1"/>
+              <p:nvPr/>
+            </p:nvSpPr>
+            <p:spPr>
+              <a:xfrm>
+                <a:off x="11258605" y="2703632"/>
+                <a:ext cx="290592" cy="276999"/>
+              </a:xfrm>
+              <a:prstGeom prst="rect">
+                <a:avLst/>
+              </a:prstGeom>
+              <a:noFill/>
+            </p:spPr>
+            <p:txBody>
+              <a:bodyPr wrap="none" lIns="0" tIns="0" rIns="0" bIns="0" rtlCol="0">
+                <a:spAutoFit/>
+              </a:bodyPr>
+              <a:lstStyle/>
+              <a:p>
+                <a:pPr/>
+                <a14:m>
+                  <m:oMathPara xmlns:m="http://schemas.openxmlformats.org/officeDocument/2006/math">
+                    <m:oMathParaPr>
+                      <m:jc m:val="centerGroup"/>
+                    </m:oMathParaPr>
+                    <m:oMath xmlns:m="http://schemas.openxmlformats.org/officeDocument/2006/math">
+                      <m:sSub>
+                        <m:sSubPr>
+                          <m:ctrlPr>
+                            <a:rPr lang="en-US" altLang="zh-CN" b="0" i="1" smtClean="0">
+                              <a:latin typeface="Cambria Math" panose="02040503050406030204" pitchFamily="18" charset="0"/>
+                            </a:rPr>
+                          </m:ctrlPr>
+                        </m:sSubPr>
+                        <m:e>
+                          <m:r>
+                            <a:rPr lang="en-US" altLang="zh-CN" b="0" i="1" smtClean="0">
+                              <a:latin typeface="Cambria Math" panose="02040503050406030204" pitchFamily="18" charset="0"/>
+                            </a:rPr>
+                            <m:t>𝑡</m:t>
+                          </m:r>
+                        </m:e>
+                        <m:sub>
+                          <m:r>
+                            <a:rPr lang="en-US" altLang="zh-CN" b="0" i="1" smtClean="0">
+                              <a:latin typeface="Cambria Math" panose="02040503050406030204" pitchFamily="18" charset="0"/>
+                            </a:rPr>
+                            <m:t>𝑁</m:t>
+                          </m:r>
+                        </m:sub>
+                      </m:sSub>
+                    </m:oMath>
+                  </m:oMathPara>
+                </a14:m>
+                <a:endParaRPr lang="zh-CN" altLang="en-US" i="1" dirty="0"/>
+              </a:p>
+            </p:txBody>
+          </p:sp>
+        </mc:Choice>
+        <mc:Fallback xmlns="">
+          <p:sp>
+            <p:nvSpPr>
+              <p:cNvPr id="15" name="文本框 14"/>
+              <p:cNvSpPr txBox="1">
+                <a:spLocks noRot="1" noChangeAspect="1" noMove="1" noResize="1" noEditPoints="1" noAdjustHandles="1" noChangeArrowheads="1" noChangeShapeType="1" noTextEdit="1"/>
+              </p:cNvSpPr>
+              <p:nvPr/>
+            </p:nvSpPr>
+            <p:spPr>
+              <a:xfrm>
+                <a:off x="11258605" y="2703632"/>
+                <a:ext cx="290592" cy="276999"/>
+              </a:xfrm>
+              <a:prstGeom prst="rect">
+                <a:avLst/>
+              </a:prstGeom>
+              <a:blipFill>
+                <a:blip r:embed="rId15"/>
+                <a:stretch>
+                  <a:fillRect l="-16667" r="-2083" b="-15556"/>
+                </a:stretch>
+              </a:blipFill>
+            </p:spPr>
+            <p:txBody>
+              <a:bodyPr/>
+              <a:lstStyle/>
+              <a:p>
+                <a:r>
+                  <a:rPr lang="zh-CN" altLang="en-US">
+                    <a:noFill/>
+                  </a:rPr>
+                  <a:t> </a:t>
+                </a:r>
+              </a:p>
+            </p:txBody>
+          </p:sp>
+        </mc:Fallback>
+      </mc:AlternateContent>
+      <mc:AlternateContent xmlns:mc="http://schemas.openxmlformats.org/markup-compatibility/2006" xmlns:a14="http://schemas.microsoft.com/office/drawing/2010/main">
+        <mc:Choice Requires="a14">
+          <p:sp>
+            <p:nvSpPr>
+              <p:cNvPr id="31" name="文本框 30"/>
+              <p:cNvSpPr txBox="1"/>
+              <p:nvPr/>
+            </p:nvSpPr>
+            <p:spPr>
+              <a:xfrm>
+                <a:off x="7458897" y="2426633"/>
+                <a:ext cx="486222" cy="300788"/>
+              </a:xfrm>
+              <a:prstGeom prst="rect">
+                <a:avLst/>
+              </a:prstGeom>
+              <a:noFill/>
+            </p:spPr>
+            <p:txBody>
+              <a:bodyPr wrap="none" lIns="0" tIns="0" rIns="0" bIns="0" rtlCol="0">
+                <a:spAutoFit/>
+              </a:bodyPr>
+              <a:lstStyle/>
+              <a:p>
+                <a:pPr/>
+                <a14:m>
+                  <m:oMathPara xmlns:m="http://schemas.openxmlformats.org/officeDocument/2006/math">
+                    <m:oMathParaPr>
+                      <m:jc m:val="centerGroup"/>
+                    </m:oMathParaPr>
+                    <m:oMath xmlns:m="http://schemas.openxmlformats.org/officeDocument/2006/math">
+                      <m:sSub>
+                        <m:sSubPr>
+                          <m:ctrlPr>
+                            <a:rPr lang="en-US" altLang="zh-CN" b="0" i="1" smtClean="0">
+                              <a:latin typeface="Cambria Math" panose="02040503050406030204" pitchFamily="18" charset="0"/>
+                            </a:rPr>
+                          </m:ctrlPr>
+                        </m:sSubPr>
+                        <m:e>
+                          <m:r>
+                            <a:rPr lang="en-US" altLang="zh-CN" b="0" i="1" smtClean="0">
+                              <a:latin typeface="Cambria Math" panose="02040503050406030204" pitchFamily="18" charset="0"/>
+                            </a:rPr>
+                            <m:t>𝜔</m:t>
+                          </m:r>
+                        </m:e>
+                        <m:sub>
+                          <m:sSub>
+                            <m:sSubPr>
+                              <m:ctrlPr>
+                                <a:rPr lang="en-US" altLang="zh-CN" b="0" i="1" smtClean="0">
+                                  <a:latin typeface="Cambria Math" panose="02040503050406030204" pitchFamily="18" charset="0"/>
+                                </a:rPr>
+                              </m:ctrlPr>
+                            </m:sSubPr>
+                            <m:e>
+                              <m:r>
+                                <a:rPr lang="en-US" altLang="zh-CN" b="0" i="1" smtClean="0">
+                                  <a:latin typeface="Cambria Math" panose="02040503050406030204" pitchFamily="18" charset="0"/>
+                                </a:rPr>
+                                <m:t>𝑁</m:t>
+                              </m:r>
+                            </m:e>
+                            <m:sub>
+                              <m:r>
+                                <m:rPr>
+                                  <m:sty m:val="p"/>
+                                </m:rPr>
+                                <a:rPr lang="en-US" altLang="zh-CN" b="0" i="0" smtClean="0">
+                                  <a:latin typeface="Cambria Math" panose="02040503050406030204" pitchFamily="18" charset="0"/>
+                                </a:rPr>
+                                <m:t>Ω</m:t>
+                              </m:r>
+                            </m:sub>
+                          </m:sSub>
+                        </m:sub>
+                      </m:sSub>
+                    </m:oMath>
+                  </m:oMathPara>
+                </a14:m>
+                <a:endParaRPr lang="zh-CN" altLang="en-US" dirty="0"/>
+              </a:p>
+            </p:txBody>
+          </p:sp>
+        </mc:Choice>
+        <mc:Fallback xmlns="">
+          <p:sp>
+            <p:nvSpPr>
+              <p:cNvPr id="31" name="文本框 30"/>
+              <p:cNvSpPr txBox="1">
+                <a:spLocks noRot="1" noChangeAspect="1" noMove="1" noResize="1" noEditPoints="1" noAdjustHandles="1" noChangeArrowheads="1" noChangeShapeType="1" noTextEdit="1"/>
+              </p:cNvSpPr>
+              <p:nvPr/>
+            </p:nvSpPr>
+            <p:spPr>
+              <a:xfrm>
+                <a:off x="7458897" y="2426633"/>
+                <a:ext cx="486222" cy="300788"/>
+              </a:xfrm>
+              <a:prstGeom prst="rect">
+                <a:avLst/>
+              </a:prstGeom>
+              <a:blipFill>
+                <a:blip r:embed="rId16"/>
+                <a:stretch>
+                  <a:fillRect l="-6329" r="-1266" b="-18367"/>
+                </a:stretch>
+              </a:blipFill>
+            </p:spPr>
+            <p:txBody>
+              <a:bodyPr/>
+              <a:lstStyle/>
+              <a:p>
+                <a:r>
+                  <a:rPr lang="zh-CN" altLang="en-US">
+                    <a:noFill/>
+                  </a:rPr>
+                  <a:t> </a:t>
+                </a:r>
+              </a:p>
+            </p:txBody>
+          </p:sp>
+        </mc:Fallback>
+      </mc:AlternateContent>
+      <mc:AlternateContent xmlns:mc="http://schemas.openxmlformats.org/markup-compatibility/2006" xmlns:a14="http://schemas.microsoft.com/office/drawing/2010/main">
+        <mc:Choice Requires="a14">
+          <p:sp>
+            <p:nvSpPr>
+              <p:cNvPr id="32" name="文本框 31"/>
+              <p:cNvSpPr txBox="1"/>
+              <p:nvPr/>
+            </p:nvSpPr>
+            <p:spPr>
+              <a:xfrm>
+                <a:off x="4943192" y="1560655"/>
+                <a:ext cx="833562" cy="285912"/>
+              </a:xfrm>
+              <a:prstGeom prst="rect">
+                <a:avLst/>
+              </a:prstGeom>
+              <a:noFill/>
+            </p:spPr>
+            <p:txBody>
+              <a:bodyPr wrap="none" lIns="0" tIns="0" rIns="0" bIns="0" rtlCol="0">
+                <a:spAutoFit/>
+              </a:bodyPr>
+              <a:lstStyle/>
+              <a:p>
+                <a:pPr/>
+                <a14:m>
+                  <m:oMathPara xmlns:m="http://schemas.openxmlformats.org/officeDocument/2006/math">
+                    <m:oMathParaPr>
+                      <m:jc m:val="centerGroup"/>
+                    </m:oMathParaPr>
+                    <m:oMath xmlns:m="http://schemas.openxmlformats.org/officeDocument/2006/math">
+                      <m:sSup>
+                        <m:sSupPr>
+                          <m:ctrlPr>
+                            <a:rPr lang="en-US" altLang="zh-CN" b="0" i="1" smtClean="0">
+                              <a:latin typeface="Cambria Math" panose="02040503050406030204" pitchFamily="18" charset="0"/>
+                            </a:rPr>
+                          </m:ctrlPr>
+                        </m:sSupPr>
+                        <m:e>
+                          <m:r>
+                            <a:rPr lang="en-US" altLang="zh-CN" b="0" i="1" smtClean="0">
+                              <a:latin typeface="Cambria Math" panose="02040503050406030204" pitchFamily="18" charset="0"/>
+                            </a:rPr>
+                            <m:t>𝑒</m:t>
+                          </m:r>
+                        </m:e>
+                        <m:sup>
+                          <m:r>
+                            <a:rPr lang="en-US" altLang="zh-CN" b="0" i="1" smtClean="0">
+                              <a:latin typeface="Cambria Math" panose="02040503050406030204" pitchFamily="18" charset="0"/>
+                            </a:rPr>
+                            <m:t>−</m:t>
+                          </m:r>
+                          <m:r>
+                            <a:rPr lang="en-US" altLang="zh-CN" b="0" i="1" smtClean="0">
+                              <a:latin typeface="Cambria Math" panose="02040503050406030204" pitchFamily="18" charset="0"/>
+                            </a:rPr>
+                            <m:t>𝑖</m:t>
+                          </m:r>
+                          <m:sSub>
+                            <m:sSubPr>
+                              <m:ctrlPr>
+                                <a:rPr lang="en-US" altLang="zh-CN" b="0" i="1" smtClean="0">
+                                  <a:latin typeface="Cambria Math" panose="02040503050406030204" pitchFamily="18" charset="0"/>
+                                </a:rPr>
+                              </m:ctrlPr>
+                            </m:sSubPr>
+                            <m:e>
+                              <m:r>
+                                <a:rPr lang="en-US" altLang="zh-CN" b="0" i="1" smtClean="0">
+                                  <a:latin typeface="Cambria Math" panose="02040503050406030204" pitchFamily="18" charset="0"/>
+                                </a:rPr>
+                                <m:t>𝜔</m:t>
+                              </m:r>
+                            </m:e>
+                            <m:sub>
+                              <m:r>
+                                <a:rPr lang="en-US" altLang="zh-CN" b="0" i="1" smtClean="0">
+                                  <a:latin typeface="Cambria Math" panose="02040503050406030204" pitchFamily="18" charset="0"/>
+                                </a:rPr>
+                                <m:t>𝑛</m:t>
+                              </m:r>
+                            </m:sub>
+                          </m:sSub>
+                          <m:sSub>
+                            <m:sSubPr>
+                              <m:ctrlPr>
+                                <a:rPr lang="en-US" altLang="zh-CN" b="0" i="1" smtClean="0">
+                                  <a:latin typeface="Cambria Math" panose="02040503050406030204" pitchFamily="18" charset="0"/>
+                                </a:rPr>
+                              </m:ctrlPr>
+                            </m:sSubPr>
+                            <m:e>
+                              <m:r>
+                                <a:rPr lang="en-US" altLang="zh-CN" b="0" i="1" smtClean="0">
+                                  <a:latin typeface="Cambria Math" panose="02040503050406030204" pitchFamily="18" charset="0"/>
+                                </a:rPr>
+                                <m:t>𝑡</m:t>
+                              </m:r>
+                            </m:e>
+                            <m:sub>
+                              <m:r>
+                                <a:rPr lang="en-US" altLang="zh-CN" b="0" i="1" smtClean="0">
+                                  <a:latin typeface="Cambria Math" panose="02040503050406030204" pitchFamily="18" charset="0"/>
+                                </a:rPr>
+                                <m:t>𝑁</m:t>
+                              </m:r>
+                            </m:sub>
+                          </m:sSub>
+                        </m:sup>
+                      </m:sSup>
+                    </m:oMath>
+                  </m:oMathPara>
+                </a14:m>
+                <a:endParaRPr lang="zh-CN" altLang="en-US" dirty="0"/>
+              </a:p>
+            </p:txBody>
+          </p:sp>
+        </mc:Choice>
+        <mc:Fallback xmlns="">
+          <p:sp>
+            <p:nvSpPr>
+              <p:cNvPr id="32" name="文本框 31"/>
+              <p:cNvSpPr txBox="1">
+                <a:spLocks noRot="1" noChangeAspect="1" noMove="1" noResize="1" noEditPoints="1" noAdjustHandles="1" noChangeArrowheads="1" noChangeShapeType="1" noTextEdit="1"/>
+              </p:cNvSpPr>
+              <p:nvPr/>
+            </p:nvSpPr>
+            <p:spPr>
+              <a:xfrm>
+                <a:off x="4943192" y="1560655"/>
+                <a:ext cx="833562" cy="285912"/>
+              </a:xfrm>
+              <a:prstGeom prst="rect">
+                <a:avLst/>
+              </a:prstGeom>
+              <a:blipFill>
+                <a:blip r:embed="rId17"/>
+                <a:stretch>
+                  <a:fillRect l="-2190" t="-4255"/>
+                </a:stretch>
+              </a:blipFill>
+            </p:spPr>
+            <p:txBody>
+              <a:bodyPr/>
+              <a:lstStyle/>
+              <a:p>
+                <a:r>
+                  <a:rPr lang="zh-CN" altLang="en-US">
+                    <a:noFill/>
+                  </a:rPr>
+                  <a:t> </a:t>
+                </a:r>
+              </a:p>
+            </p:txBody>
+          </p:sp>
+        </mc:Fallback>
+      </mc:AlternateContent>
+      <mc:AlternateContent xmlns:mc="http://schemas.openxmlformats.org/markup-compatibility/2006" xmlns:a14="http://schemas.microsoft.com/office/drawing/2010/main">
+        <mc:Choice Requires="a14">
+          <p:sp>
+            <p:nvSpPr>
+              <p:cNvPr id="33" name="文本框 32"/>
+              <p:cNvSpPr txBox="1"/>
+              <p:nvPr/>
+            </p:nvSpPr>
+            <p:spPr>
+              <a:xfrm>
+                <a:off x="5640309" y="2974063"/>
+                <a:ext cx="1016497" cy="276999"/>
+              </a:xfrm>
+              <a:prstGeom prst="rect">
+                <a:avLst/>
+              </a:prstGeom>
+              <a:noFill/>
+            </p:spPr>
+            <p:txBody>
+              <a:bodyPr wrap="none" lIns="0" tIns="0" rIns="0" bIns="0" rtlCol="0">
+                <a:spAutoFit/>
+              </a:bodyPr>
+              <a:lstStyle/>
+              <a:p>
+                <a:pPr/>
+                <a14:m>
+                  <m:oMathPara xmlns:m="http://schemas.openxmlformats.org/officeDocument/2006/math">
+                    <m:oMathParaPr>
+                      <m:jc m:val="centerGroup"/>
+                    </m:oMathParaPr>
+                    <m:oMath xmlns:m="http://schemas.openxmlformats.org/officeDocument/2006/math">
+                      <m:r>
+                        <a:rPr lang="en-US" altLang="zh-CN" b="0" i="1" smtClean="0">
+                          <a:latin typeface="Cambria Math" panose="02040503050406030204" pitchFamily="18" charset="0"/>
+                        </a:rPr>
+                        <m:t>𝛿</m:t>
+                      </m:r>
+                      <m:r>
+                        <a:rPr lang="en-US" altLang="zh-CN" b="0" i="1" smtClean="0">
+                          <a:latin typeface="Cambria Math" panose="02040503050406030204" pitchFamily="18" charset="0"/>
+                        </a:rPr>
+                        <m:t>(</m:t>
+                      </m:r>
+                      <m:r>
+                        <a:rPr lang="en-US" altLang="zh-CN" b="0" i="1" smtClean="0">
+                          <a:latin typeface="Cambria Math" panose="02040503050406030204" pitchFamily="18" charset="0"/>
+                        </a:rPr>
+                        <m:t>𝑡</m:t>
+                      </m:r>
+                      <m:r>
+                        <a:rPr lang="en-US" altLang="zh-CN" b="0" i="1" smtClean="0">
+                          <a:latin typeface="Cambria Math" panose="02040503050406030204" pitchFamily="18" charset="0"/>
+                        </a:rPr>
+                        <m:t>−</m:t>
+                      </m:r>
+                      <m:sSub>
+                        <m:sSubPr>
+                          <m:ctrlPr>
+                            <a:rPr lang="en-US" altLang="zh-CN" b="0" i="1" smtClean="0">
+                              <a:latin typeface="Cambria Math" panose="02040503050406030204" pitchFamily="18" charset="0"/>
+                            </a:rPr>
+                          </m:ctrlPr>
+                        </m:sSubPr>
+                        <m:e>
+                          <m:r>
+                            <a:rPr lang="en-US" altLang="zh-CN" b="0" i="1" smtClean="0">
+                              <a:latin typeface="Cambria Math" panose="02040503050406030204" pitchFamily="18" charset="0"/>
+                            </a:rPr>
+                            <m:t>𝑡</m:t>
+                          </m:r>
+                        </m:e>
+                        <m:sub>
+                          <m:r>
+                            <a:rPr lang="en-US" altLang="zh-CN" b="0" i="1" smtClean="0">
+                              <a:latin typeface="Cambria Math" panose="02040503050406030204" pitchFamily="18" charset="0"/>
+                            </a:rPr>
+                            <m:t>𝑁</m:t>
+                          </m:r>
+                        </m:sub>
+                      </m:sSub>
+                      <m:r>
+                        <a:rPr lang="en-US" altLang="zh-CN" b="0" i="1" smtClean="0">
+                          <a:latin typeface="Cambria Math" panose="02040503050406030204" pitchFamily="18" charset="0"/>
+                        </a:rPr>
+                        <m:t>)</m:t>
+                      </m:r>
+                    </m:oMath>
+                  </m:oMathPara>
+                </a14:m>
+                <a:endParaRPr lang="zh-CN" altLang="en-US" dirty="0"/>
+              </a:p>
+            </p:txBody>
+          </p:sp>
+        </mc:Choice>
+        <mc:Fallback xmlns="">
+          <p:sp>
+            <p:nvSpPr>
+              <p:cNvPr id="33" name="文本框 32"/>
+              <p:cNvSpPr txBox="1">
+                <a:spLocks noRot="1" noChangeAspect="1" noMove="1" noResize="1" noEditPoints="1" noAdjustHandles="1" noChangeArrowheads="1" noChangeShapeType="1" noTextEdit="1"/>
+              </p:cNvSpPr>
+              <p:nvPr/>
+            </p:nvSpPr>
+            <p:spPr>
+              <a:xfrm>
+                <a:off x="5640309" y="2974063"/>
+                <a:ext cx="1016497" cy="276999"/>
+              </a:xfrm>
+              <a:prstGeom prst="rect">
+                <a:avLst/>
+              </a:prstGeom>
+              <a:blipFill>
+                <a:blip r:embed="rId18"/>
+                <a:stretch>
+                  <a:fillRect l="-3593" t="-2222" r="-6587" b="-35556"/>
+                </a:stretch>
+              </a:blipFill>
+            </p:spPr>
+            <p:txBody>
+              <a:bodyPr/>
+              <a:lstStyle/>
+              <a:p>
+                <a:r>
+                  <a:rPr lang="zh-CN" altLang="en-US">
+                    <a:noFill/>
+                  </a:rPr>
+                  <a:t> </a:t>
+                </a:r>
+              </a:p>
+            </p:txBody>
+          </p:sp>
+        </mc:Fallback>
+      </mc:AlternateContent>
     </p:spTree>
     <p:extLst>
       <p:ext uri="{BB962C8B-B14F-4D97-AF65-F5344CB8AC3E}">
         <p14:creationId xmlns:p14="http://schemas.microsoft.com/office/powerpoint/2010/main" val="918091117"/>
+      </p:ext>
+    </p:extLst>
+  </p:cSld>
+  <p:clrMapOvr>
+    <a:masterClrMapping/>
+  </p:clrMapOvr>
+</p:sld>
+</file>
+
+<file path=ppt/slides/slide3.xml><?xml version="1.0" encoding="utf-8"?>
+<p:sld xmlns:a="http://schemas.openxmlformats.org/drawingml/2006/main" xmlns:r="http://schemas.openxmlformats.org/officeDocument/2006/relationships" xmlns:p="http://schemas.openxmlformats.org/presentationml/2006/main">
+  <p:cSld>
+    <p:spTree>
+      <p:nvGrpSpPr>
+        <p:cNvPr id="1" name=""/>
+        <p:cNvGrpSpPr/>
+        <p:nvPr/>
+      </p:nvGrpSpPr>
+      <p:grpSpPr>
+        <a:xfrm>
+          <a:off x="0" y="0"/>
+          <a:ext cx="0" cy="0"/>
+          <a:chOff x="0" y="0"/>
+          <a:chExt cx="0" cy="0"/>
+        </a:xfrm>
+      </p:grpSpPr>
+      <p:pic>
+        <p:nvPicPr>
+          <p:cNvPr id="4" name="图片 3"/>
+          <p:cNvPicPr>
+            <a:picLocks noChangeAspect="1"/>
+          </p:cNvPicPr>
+          <p:nvPr/>
+        </p:nvPicPr>
+        <p:blipFill>
+          <a:blip r:embed="rId2"/>
+          <a:stretch>
+            <a:fillRect/>
+          </a:stretch>
+        </p:blipFill>
+        <p:spPr>
+          <a:xfrm>
+            <a:off x="4569346" y="2654467"/>
+            <a:ext cx="1440003" cy="730572"/>
+          </a:xfrm>
+          <a:prstGeom prst="rect">
+            <a:avLst/>
+          </a:prstGeom>
+        </p:spPr>
+      </p:pic>
+    </p:spTree>
+    <p:extLst>
+      <p:ext uri="{BB962C8B-B14F-4D97-AF65-F5344CB8AC3E}">
+        <p14:creationId xmlns:p14="http://schemas.microsoft.com/office/powerpoint/2010/main" val="1477982117"/>
       </p:ext>
     </p:extLst>
   </p:cSld>

</xml_diff>